<commit_message>
Oprava preklepov a doplnenie niektorych casti
</commit_message>
<xml_diff>
--- a/Dokumentacie/Ostatne/Innovators.pptx
+++ b/Dokumentacie/Ostatne/Innovators.pptx
@@ -379,7 +379,7 @@
     </p:spTree>
     <p:extLst>
       <p:ext uri="{BB962C8B-B14F-4D97-AF65-F5344CB8AC3E}">
-        <p14:creationId xmlns:p14="http://schemas.microsoft.com/office/powerpoint/2010/main" xmlns="" val="4100813840"/>
+        <p14:creationId xmlns="" xmlns:p14="http://schemas.microsoft.com/office/powerpoint/2010/main" val="4100813840"/>
       </p:ext>
     </p:extLst>
   </p:cSld>
@@ -1185,6 +1185,88 @@
 </p:notes>
 </file>
 
+<file path=ppt/notesSlides/notesSlide16.xml><?xml version="1.0" encoding="utf-8"?>
+<p:notes xmlns:a="http://schemas.openxmlformats.org/drawingml/2006/main" xmlns:r="http://schemas.openxmlformats.org/officeDocument/2006/relationships" xmlns:p="http://schemas.openxmlformats.org/presentationml/2006/main">
+  <p:cSld>
+    <p:spTree>
+      <p:nvGrpSpPr>
+        <p:cNvPr id="1" name=""/>
+        <p:cNvGrpSpPr/>
+        <p:nvPr/>
+      </p:nvGrpSpPr>
+      <p:grpSpPr>
+        <a:xfrm>
+          <a:off x="0" y="0"/>
+          <a:ext cx="0" cy="0"/>
+          <a:chOff x="0" y="0"/>
+          <a:chExt cx="0" cy="0"/>
+        </a:xfrm>
+      </p:grpSpPr>
+      <p:sp>
+        <p:nvSpPr>
+          <p:cNvPr id="2" name="Zástupný symbol obrazu snímky 1"/>
+          <p:cNvSpPr>
+            <a:spLocks noGrp="1" noRot="1" noChangeAspect="1"/>
+          </p:cNvSpPr>
+          <p:nvPr>
+            <p:ph type="sldImg"/>
+          </p:nvPr>
+        </p:nvSpPr>
+        <p:spPr/>
+      </p:sp>
+      <p:sp>
+        <p:nvSpPr>
+          <p:cNvPr id="3" name="Zástupný symbol poznámok 2"/>
+          <p:cNvSpPr>
+            <a:spLocks noGrp="1"/>
+          </p:cNvSpPr>
+          <p:nvPr>
+            <p:ph type="body" idx="1"/>
+          </p:nvPr>
+        </p:nvSpPr>
+        <p:spPr/>
+        <p:txBody>
+          <a:bodyPr>
+            <a:normAutofit/>
+          </a:bodyPr>
+          <a:lstStyle/>
+          <a:p>
+            <a:endParaRPr lang="sk-SK"/>
+          </a:p>
+        </p:txBody>
+      </p:sp>
+      <p:sp>
+        <p:nvSpPr>
+          <p:cNvPr id="4" name="Zástupný symbol čísla snímky 3"/>
+          <p:cNvSpPr>
+            <a:spLocks noGrp="1"/>
+          </p:cNvSpPr>
+          <p:nvPr>
+            <p:ph type="sldNum" sz="quarter" idx="10"/>
+          </p:nvPr>
+        </p:nvSpPr>
+        <p:spPr/>
+        <p:txBody>
+          <a:bodyPr/>
+          <a:lstStyle/>
+          <a:p>
+            <a:fld id="{7D50ED8A-6824-479D-836F-3084D76D034C}" type="slidenum">
+              <a:rPr lang="sk-SK" smtClean="0"/>
+              <a:pPr/>
+              <a:t>16</a:t>
+            </a:fld>
+            <a:endParaRPr lang="sk-SK"/>
+          </a:p>
+        </p:txBody>
+      </p:sp>
+    </p:spTree>
+  </p:cSld>
+  <p:clrMapOvr>
+    <a:masterClrMapping/>
+  </p:clrMapOvr>
+</p:notes>
+</file>
+
 <file path=ppt/notesSlides/notesSlide2.xml><?xml version="1.0" encoding="utf-8"?>
 <p:notes xmlns:a="http://schemas.openxmlformats.org/drawingml/2006/main" xmlns:r="http://schemas.openxmlformats.org/officeDocument/2006/relationships" xmlns:p="http://schemas.openxmlformats.org/presentationml/2006/main">
   <p:cSld>
@@ -1396,8 +1478,24 @@
           <a:lstStyle/>
           <a:p>
             <a:r>
-              <a:rPr lang="sk-SK" smtClean="0"/>
-              <a:t>Pre názornu úkažku obrázok z editora</a:t>
+              <a:rPr lang="sk-SK" dirty="0" smtClean="0"/>
+              <a:t>Pre </a:t>
+            </a:r>
+            <a:r>
+              <a:rPr lang="sk-SK" dirty="0" err="1" smtClean="0"/>
+              <a:t>názornu</a:t>
+            </a:r>
+            <a:r>
+              <a:rPr lang="sk-SK" dirty="0" smtClean="0"/>
+              <a:t> </a:t>
+            </a:r>
+            <a:r>
+              <a:rPr lang="sk-SK" dirty="0" err="1" smtClean="0"/>
+              <a:t>úkažku</a:t>
+            </a:r>
+            <a:r>
+              <a:rPr lang="sk-SK" dirty="0" smtClean="0"/>
+              <a:t> obrázok z editora</a:t>
             </a:r>
             <a:endParaRPr lang="sk-SK" dirty="0"/>
           </a:p>
@@ -5806,7 +5904,7 @@
           <p:nvPr/>
         </p:nvPicPr>
         <p:blipFill>
-          <a:blip r:embed="rId3"/>
+          <a:blip r:embed="rId3" cstate="print"/>
           <a:srcRect/>
           <a:stretch>
             <a:fillRect/>
@@ -6871,10 +6969,10 @@
           <p:nvPr/>
         </p:nvPicPr>
         <p:blipFill>
-          <a:blip r:embed="rId3">
+          <a:blip r:embed="rId3" cstate="print">
             <a:extLst>
               <a:ext uri="{28A0092B-C50C-407E-A947-70E740481C1C}">
-                <a14:useLocalDpi xmlns:a14="http://schemas.microsoft.com/office/drawing/2010/main" xmlns="" val="0"/>
+                <a14:useLocalDpi xmlns="" xmlns:a14="http://schemas.microsoft.com/office/drawing/2010/main" val="0"/>
               </a:ext>
             </a:extLst>
           </a:blip>
@@ -7926,7 +8024,7 @@
           <a:blip r:embed="rId3" cstate="print">
             <a:extLst>
               <a:ext uri="{28A0092B-C50C-407E-A947-70E740481C1C}">
-                <a14:useLocalDpi xmlns:a14="http://schemas.microsoft.com/office/drawing/2010/main" xmlns="" val="0"/>
+                <a14:useLocalDpi xmlns="" xmlns:a14="http://schemas.microsoft.com/office/drawing/2010/main" val="0"/>
               </a:ext>
             </a:extLst>
           </a:blip>
@@ -7950,14 +8048,14 @@
           <a:effectLst/>
           <a:extLst>
             <a:ext uri="{909E8E84-426E-40DD-AFC4-6F175D3DCCD1}">
-              <a14:hiddenFill xmlns:a14="http://schemas.microsoft.com/office/drawing/2010/main" xmlns="">
+              <a14:hiddenFill xmlns="" xmlns:a14="http://schemas.microsoft.com/office/drawing/2010/main">
                 <a:solidFill>
                   <a:schemeClr val="accent1"/>
                 </a:solidFill>
               </a14:hiddenFill>
             </a:ext>
             <a:ext uri="{91240B29-F687-4F45-9708-019B960494DF}">
-              <a14:hiddenLine xmlns:a14="http://schemas.microsoft.com/office/drawing/2010/main" xmlns="" w="9525">
+              <a14:hiddenLine xmlns="" xmlns:a14="http://schemas.microsoft.com/office/drawing/2010/main" w="9525">
                 <a:solidFill>
                   <a:schemeClr val="tx1"/>
                 </a:solidFill>
@@ -7967,7 +8065,7 @@
               </a14:hiddenLine>
             </a:ext>
             <a:ext uri="{AF507438-7753-43E0-B8FC-AC1667EBCBE1}">
-              <a14:hiddenEffects xmlns:a14="http://schemas.microsoft.com/office/drawing/2010/main" xmlns="">
+              <a14:hiddenEffects xmlns="" xmlns:a14="http://schemas.microsoft.com/office/drawing/2010/main">
                 <a:effectLst>
                   <a:outerShdw dist="35921" dir="2700000" algn="ctr" rotWithShape="0">
                     <a:schemeClr val="bg2"/>
@@ -8711,7 +8809,7 @@
               <a:defRPr/>
             </a:pPr>
             <a:r>
-              <a:rPr lang="sk-SK" sz="2000" kern="0" smtClean="0">
+              <a:rPr lang="sk-SK" sz="2000" kern="0" dirty="0" smtClean="0">
                 <a:ln w="18415" cmpd="sng">
                   <a:noFill/>
                   <a:prstDash val="solid"/>
@@ -8729,7 +8827,49 @@
                 <a:latin typeface="Times New Roman" pitchFamily="18" charset="0"/>
                 <a:cs typeface="Times New Roman" pitchFamily="18" charset="0"/>
               </a:rPr>
-              <a:t> Vykonaný refactoring podľa zadefinovaných štýlov</a:t>
+              <a:t> Vykonaný </a:t>
+            </a:r>
+            <a:r>
+              <a:rPr lang="sk-SK" sz="2000" kern="0" dirty="0" err="1" smtClean="0">
+                <a:ln w="18415" cmpd="sng">
+                  <a:noFill/>
+                  <a:prstDash val="solid"/>
+                </a:ln>
+                <a:solidFill>
+                  <a:srgbClr val="FFFFFF"/>
+                </a:solidFill>
+                <a:effectLst>
+                  <a:outerShdw blurRad="50800" dist="38100" dir="2700000" algn="tl" rotWithShape="0">
+                    <a:prstClr val="black">
+                      <a:alpha val="40000"/>
+                    </a:prstClr>
+                  </a:outerShdw>
+                </a:effectLst>
+                <a:latin typeface="Times New Roman" pitchFamily="18" charset="0"/>
+                <a:cs typeface="Times New Roman" pitchFamily="18" charset="0"/>
+              </a:rPr>
+              <a:t>refactoring</a:t>
+            </a:r>
+            <a:r>
+              <a:rPr lang="sk-SK" sz="2000" kern="0" dirty="0" smtClean="0">
+                <a:ln w="18415" cmpd="sng">
+                  <a:noFill/>
+                  <a:prstDash val="solid"/>
+                </a:ln>
+                <a:solidFill>
+                  <a:srgbClr val="FFFFFF"/>
+                </a:solidFill>
+                <a:effectLst>
+                  <a:outerShdw blurRad="50800" dist="38100" dir="2700000" algn="tl" rotWithShape="0">
+                    <a:prstClr val="black">
+                      <a:alpha val="40000"/>
+                    </a:prstClr>
+                  </a:outerShdw>
+                </a:effectLst>
+                <a:latin typeface="Times New Roman" pitchFamily="18" charset="0"/>
+                <a:cs typeface="Times New Roman" pitchFamily="18" charset="0"/>
+              </a:rPr>
+              <a:t> podľa zadefinovaných štýlov</a:t>
             </a:r>
           </a:p>
           <a:p>
@@ -8742,7 +8882,7 @@
               <a:defRPr/>
             </a:pPr>
             <a:r>
-              <a:rPr lang="sk-SK" sz="2000" kern="0" smtClean="0">
+              <a:rPr lang="sk-SK" sz="2000" kern="0" dirty="0" smtClean="0">
                 <a:ln w="18415" cmpd="sng">
                   <a:noFill/>
                   <a:prstDash val="solid"/>
@@ -8760,8 +8900,47 @@
                 <a:latin typeface="Times New Roman" pitchFamily="18" charset="0"/>
                 <a:cs typeface="Times New Roman" pitchFamily="18" charset="0"/>
               </a:rPr>
-              <a:t> Implementácia funkcií pre prácu s AST stromom na strane Lua</a:t>
-            </a:r>
+              <a:t> Implementácia funkcií pre prácu s AST stromom na strane </a:t>
+            </a:r>
+            <a:r>
+              <a:rPr lang="sk-SK" sz="2000" kern="0" dirty="0" err="1" smtClean="0">
+                <a:ln w="18415" cmpd="sng">
+                  <a:noFill/>
+                  <a:prstDash val="solid"/>
+                </a:ln>
+                <a:solidFill>
+                  <a:srgbClr val="FFFFFF"/>
+                </a:solidFill>
+                <a:effectLst>
+                  <a:outerShdw blurRad="50800" dist="38100" dir="2700000" algn="tl" rotWithShape="0">
+                    <a:prstClr val="black">
+                      <a:alpha val="40000"/>
+                    </a:prstClr>
+                  </a:outerShdw>
+                </a:effectLst>
+                <a:latin typeface="Times New Roman" pitchFamily="18" charset="0"/>
+                <a:cs typeface="Times New Roman" pitchFamily="18" charset="0"/>
+              </a:rPr>
+              <a:t>Lua</a:t>
+            </a:r>
+            <a:endParaRPr lang="sk-SK" sz="2000" kern="0" dirty="0" smtClean="0">
+              <a:ln w="18415" cmpd="sng">
+                <a:noFill/>
+                <a:prstDash val="solid"/>
+              </a:ln>
+              <a:solidFill>
+                <a:srgbClr val="FFFFFF"/>
+              </a:solidFill>
+              <a:effectLst>
+                <a:outerShdw blurRad="50800" dist="38100" dir="2700000" algn="tl" rotWithShape="0">
+                  <a:prstClr val="black">
+                    <a:alpha val="40000"/>
+                  </a:prstClr>
+                </a:outerShdw>
+              </a:effectLst>
+              <a:latin typeface="Times New Roman" pitchFamily="18" charset="0"/>
+              <a:cs typeface="Times New Roman" pitchFamily="18" charset="0"/>
+            </a:endParaRPr>
           </a:p>
           <a:p>
             <a:pPr>
@@ -8773,7 +8952,7 @@
               <a:defRPr/>
             </a:pPr>
             <a:r>
-              <a:rPr lang="sk-SK" sz="2000" kern="0" smtClean="0">
+              <a:rPr lang="sk-SK" sz="2000" kern="0" dirty="0" smtClean="0">
                 <a:ln w="18415" cmpd="sng">
                   <a:noFill/>
                   <a:prstDash val="solid"/>
@@ -8791,7 +8970,112 @@
                 <a:latin typeface="Times New Roman" pitchFamily="18" charset="0"/>
                 <a:cs typeface="Times New Roman" pitchFamily="18" charset="0"/>
               </a:rPr>
-              <a:t> Zabudovanie dvoch módov – Undo Redo v rámci práce s textom</a:t>
+              <a:t> Zabudovanie dvoch módov – </a:t>
+            </a:r>
+            <a:r>
+              <a:rPr lang="sk-SK" sz="2000" kern="0" dirty="0" err="1" smtClean="0">
+                <a:ln w="18415" cmpd="sng">
+                  <a:noFill/>
+                  <a:prstDash val="solid"/>
+                </a:ln>
+                <a:solidFill>
+                  <a:srgbClr val="FFFFFF"/>
+                </a:solidFill>
+                <a:effectLst>
+                  <a:outerShdw blurRad="50800" dist="38100" dir="2700000" algn="tl" rotWithShape="0">
+                    <a:prstClr val="black">
+                      <a:alpha val="40000"/>
+                    </a:prstClr>
+                  </a:outerShdw>
+                </a:effectLst>
+                <a:latin typeface="Times New Roman" pitchFamily="18" charset="0"/>
+                <a:cs typeface="Times New Roman" pitchFamily="18" charset="0"/>
+              </a:rPr>
+              <a:t>Undo</a:t>
+            </a:r>
+            <a:r>
+              <a:rPr lang="en-US" sz="2000" kern="0" dirty="0" smtClean="0">
+                <a:ln w="18415" cmpd="sng">
+                  <a:noFill/>
+                  <a:prstDash val="solid"/>
+                </a:ln>
+                <a:solidFill>
+                  <a:srgbClr val="FFFFFF"/>
+                </a:solidFill>
+                <a:effectLst>
+                  <a:outerShdw blurRad="50800" dist="38100" dir="2700000" algn="tl" rotWithShape="0">
+                    <a:prstClr val="black">
+                      <a:alpha val="40000"/>
+                    </a:prstClr>
+                  </a:outerShdw>
+                </a:effectLst>
+                <a:latin typeface="Times New Roman" pitchFamily="18" charset="0"/>
+                <a:cs typeface="Times New Roman" pitchFamily="18" charset="0"/>
+              </a:rPr>
+              <a:t>/</a:t>
+            </a:r>
+            <a:r>
+              <a:rPr lang="sk-SK" sz="2000" kern="0" dirty="0" err="1" smtClean="0">
+                <a:ln w="18415" cmpd="sng">
+                  <a:noFill/>
+                  <a:prstDash val="solid"/>
+                </a:ln>
+                <a:solidFill>
+                  <a:srgbClr val="FFFFFF"/>
+                </a:solidFill>
+                <a:effectLst>
+                  <a:outerShdw blurRad="50800" dist="38100" dir="2700000" algn="tl" rotWithShape="0">
+                    <a:prstClr val="black">
+                      <a:alpha val="40000"/>
+                    </a:prstClr>
+                  </a:outerShdw>
+                </a:effectLst>
+                <a:latin typeface="Times New Roman" pitchFamily="18" charset="0"/>
+                <a:cs typeface="Times New Roman" pitchFamily="18" charset="0"/>
+              </a:rPr>
+              <a:t>Redo</a:t>
+            </a:r>
+            <a:r>
+              <a:rPr lang="sk-SK" sz="2000" kern="0" dirty="0" smtClean="0">
+                <a:ln w="18415" cmpd="sng">
+                  <a:noFill/>
+                  <a:prstDash val="solid"/>
+                </a:ln>
+                <a:solidFill>
+                  <a:srgbClr val="FFFFFF"/>
+                </a:solidFill>
+                <a:effectLst>
+                  <a:outerShdw blurRad="50800" dist="38100" dir="2700000" algn="tl" rotWithShape="0">
+                    <a:prstClr val="black">
+                      <a:alpha val="40000"/>
+                    </a:prstClr>
+                  </a:outerShdw>
+                </a:effectLst>
+                <a:latin typeface="Times New Roman" pitchFamily="18" charset="0"/>
+                <a:cs typeface="Times New Roman" pitchFamily="18" charset="0"/>
+              </a:rPr>
+              <a:t> </a:t>
+            </a:r>
+            <a:r>
+              <a:rPr lang="sk-SK" sz="2000" kern="0" dirty="0" smtClean="0">
+                <a:ln w="18415" cmpd="sng">
+                  <a:noFill/>
+                  <a:prstDash val="solid"/>
+                </a:ln>
+                <a:solidFill>
+                  <a:srgbClr val="FFFFFF"/>
+                </a:solidFill>
+                <a:effectLst>
+                  <a:outerShdw blurRad="50800" dist="38100" dir="2700000" algn="tl" rotWithShape="0">
+                    <a:prstClr val="black">
+                      <a:alpha val="40000"/>
+                    </a:prstClr>
+                  </a:outerShdw>
+                </a:effectLst>
+                <a:latin typeface="Times New Roman" pitchFamily="18" charset="0"/>
+                <a:cs typeface="Times New Roman" pitchFamily="18" charset="0"/>
+              </a:rPr>
+              <a:t>v rámci práce s textom</a:t>
             </a:r>
           </a:p>
           <a:p>
@@ -8804,7 +9088,7 @@
               <a:defRPr/>
             </a:pPr>
             <a:r>
-              <a:rPr lang="sk-SK" sz="2000" kern="0" smtClean="0">
+              <a:rPr lang="sk-SK" sz="2000" kern="0" dirty="0" smtClean="0">
                 <a:ln w="18415" cmpd="sng">
                   <a:noFill/>
                   <a:prstDash val="solid"/>
@@ -8822,7 +9106,91 @@
                 <a:latin typeface="Times New Roman" pitchFamily="18" charset="0"/>
                 <a:cs typeface="Times New Roman" pitchFamily="18" charset="0"/>
               </a:rPr>
-              <a:t> Zabudovanie paralelizmu – spracovanie syntaktickej analýzi na pozadí</a:t>
+              <a:t> Zabudovanie paralelizmu – spracovanie syntaktickej </a:t>
+            </a:r>
+            <a:r>
+              <a:rPr lang="sk-SK" sz="2000" kern="0" dirty="0" smtClean="0">
+                <a:ln w="18415" cmpd="sng">
+                  <a:noFill/>
+                  <a:prstDash val="solid"/>
+                </a:ln>
+                <a:solidFill>
+                  <a:srgbClr val="FFFFFF"/>
+                </a:solidFill>
+                <a:effectLst>
+                  <a:outerShdw blurRad="50800" dist="38100" dir="2700000" algn="tl" rotWithShape="0">
+                    <a:prstClr val="black">
+                      <a:alpha val="40000"/>
+                    </a:prstClr>
+                  </a:outerShdw>
+                </a:effectLst>
+                <a:latin typeface="Times New Roman" pitchFamily="18" charset="0"/>
+                <a:cs typeface="Times New Roman" pitchFamily="18" charset="0"/>
+              </a:rPr>
+              <a:t>analýz</a:t>
+            </a:r>
+            <a:r>
+              <a:rPr lang="en-US" sz="2000" kern="0" dirty="0" smtClean="0">
+                <a:ln w="18415" cmpd="sng">
+                  <a:noFill/>
+                  <a:prstDash val="solid"/>
+                </a:ln>
+                <a:solidFill>
+                  <a:srgbClr val="FFFFFF"/>
+                </a:solidFill>
+                <a:effectLst>
+                  <a:outerShdw blurRad="50800" dist="38100" dir="2700000" algn="tl" rotWithShape="0">
+                    <a:prstClr val="black">
+                      <a:alpha val="40000"/>
+                    </a:prstClr>
+                  </a:outerShdw>
+                </a:effectLst>
+                <a:latin typeface="Times New Roman" pitchFamily="18" charset="0"/>
+                <a:cs typeface="Times New Roman" pitchFamily="18" charset="0"/>
+              </a:rPr>
+              <a:t>y</a:t>
+            </a:r>
+            <a:r>
+              <a:rPr lang="sk-SK" sz="2000" kern="0" dirty="0" smtClean="0">
+                <a:ln w="18415" cmpd="sng">
+                  <a:noFill/>
+                  <a:prstDash val="solid"/>
+                </a:ln>
+                <a:solidFill>
+                  <a:srgbClr val="FFFFFF"/>
+                </a:solidFill>
+                <a:effectLst>
+                  <a:outerShdw blurRad="50800" dist="38100" dir="2700000" algn="tl" rotWithShape="0">
+                    <a:prstClr val="black">
+                      <a:alpha val="40000"/>
+                    </a:prstClr>
+                  </a:outerShdw>
+                </a:effectLst>
+                <a:latin typeface="Times New Roman" pitchFamily="18" charset="0"/>
+                <a:cs typeface="Times New Roman" pitchFamily="18" charset="0"/>
+              </a:rPr>
+              <a:t> </a:t>
+            </a:r>
+            <a:r>
+              <a:rPr lang="sk-SK" sz="2000" kern="0" dirty="0" smtClean="0">
+                <a:ln w="18415" cmpd="sng">
+                  <a:noFill/>
+                  <a:prstDash val="solid"/>
+                </a:ln>
+                <a:solidFill>
+                  <a:srgbClr val="FFFFFF"/>
+                </a:solidFill>
+                <a:effectLst>
+                  <a:outerShdw blurRad="50800" dist="38100" dir="2700000" algn="tl" rotWithShape="0">
+                    <a:prstClr val="black">
+                      <a:alpha val="40000"/>
+                    </a:prstClr>
+                  </a:outerShdw>
+                </a:effectLst>
+                <a:latin typeface="Times New Roman" pitchFamily="18" charset="0"/>
+                <a:cs typeface="Times New Roman" pitchFamily="18" charset="0"/>
+              </a:rPr>
+              <a:t>na pozadí</a:t>
             </a:r>
           </a:p>
           <a:p>
@@ -8835,7 +9203,7 @@
               <a:defRPr/>
             </a:pPr>
             <a:r>
-              <a:rPr lang="sk-SK" sz="2000" kern="0" smtClean="0">
+              <a:rPr lang="sk-SK" sz="2000" kern="0" dirty="0" smtClean="0">
                 <a:ln w="18415" cmpd="sng">
                   <a:noFill/>
                   <a:prstDash val="solid"/>
@@ -8853,7 +9221,49 @@
                 <a:latin typeface="Times New Roman" pitchFamily="18" charset="0"/>
                 <a:cs typeface="Times New Roman" pitchFamily="18" charset="0"/>
               </a:rPr>
-              <a:t> Zabudovanie Shortcuts – rozšírenie existujúcich skratiek </a:t>
+              <a:t> Zabudovanie </a:t>
+            </a:r>
+            <a:r>
+              <a:rPr lang="sk-SK" sz="2000" kern="0" dirty="0" err="1" smtClean="0">
+                <a:ln w="18415" cmpd="sng">
+                  <a:noFill/>
+                  <a:prstDash val="solid"/>
+                </a:ln>
+                <a:solidFill>
+                  <a:srgbClr val="FFFFFF"/>
+                </a:solidFill>
+                <a:effectLst>
+                  <a:outerShdw blurRad="50800" dist="38100" dir="2700000" algn="tl" rotWithShape="0">
+                    <a:prstClr val="black">
+                      <a:alpha val="40000"/>
+                    </a:prstClr>
+                  </a:outerShdw>
+                </a:effectLst>
+                <a:latin typeface="Times New Roman" pitchFamily="18" charset="0"/>
+                <a:cs typeface="Times New Roman" pitchFamily="18" charset="0"/>
+              </a:rPr>
+              <a:t>Shortcuts</a:t>
+            </a:r>
+            <a:r>
+              <a:rPr lang="sk-SK" sz="2000" kern="0" dirty="0" smtClean="0">
+                <a:ln w="18415" cmpd="sng">
+                  <a:noFill/>
+                  <a:prstDash val="solid"/>
+                </a:ln>
+                <a:solidFill>
+                  <a:srgbClr val="FFFFFF"/>
+                </a:solidFill>
+                <a:effectLst>
+                  <a:outerShdw blurRad="50800" dist="38100" dir="2700000" algn="tl" rotWithShape="0">
+                    <a:prstClr val="black">
+                      <a:alpha val="40000"/>
+                    </a:prstClr>
+                  </a:outerShdw>
+                </a:effectLst>
+                <a:latin typeface="Times New Roman" pitchFamily="18" charset="0"/>
+                <a:cs typeface="Times New Roman" pitchFamily="18" charset="0"/>
+              </a:rPr>
+              <a:t> – rozšírenie existujúcich skratiek </a:t>
             </a:r>
           </a:p>
           <a:p>
@@ -8866,7 +9276,7 @@
               <a:defRPr/>
             </a:pPr>
             <a:r>
-              <a:rPr lang="sk-SK" sz="2000" kern="0" smtClean="0">
+              <a:rPr lang="sk-SK" sz="2000" kern="0" dirty="0" smtClean="0">
                 <a:ln w="18415" cmpd="sng">
                   <a:noFill/>
                   <a:prstDash val="solid"/>
@@ -8884,30 +9294,9 @@
                 <a:latin typeface="Times New Roman" pitchFamily="18" charset="0"/>
                 <a:cs typeface="Times New Roman" pitchFamily="18" charset="0"/>
               </a:rPr>
-              <a:t> Úprava editora za použitia CSS </a:t>
-            </a:r>
-            <a:r>
-              <a:rPr lang="sk-SK" sz="2000" kern="0" smtClean="0">
-                <a:ln w="18415" cmpd="sng">
-                  <a:noFill/>
-                  <a:prstDash val="solid"/>
-                </a:ln>
-                <a:solidFill>
-                  <a:srgbClr val="FFFFFF"/>
-                </a:solidFill>
-                <a:effectLst>
-                  <a:outerShdw blurRad="50800" dist="38100" dir="2700000" algn="tl" rotWithShape="0">
-                    <a:prstClr val="black">
-                      <a:alpha val="40000"/>
-                    </a:prstClr>
-                  </a:outerShdw>
-                </a:effectLst>
-                <a:latin typeface="Times New Roman" pitchFamily="18" charset="0"/>
-                <a:cs typeface="Times New Roman" pitchFamily="18" charset="0"/>
-              </a:rPr>
-              <a:t>štýlov</a:t>
-            </a:r>
-            <a:endParaRPr lang="pl-PL" sz="2000" kern="0" smtClean="0">
+              <a:t> Úprava editora za použitia CSS štýlov</a:t>
+            </a:r>
+            <a:endParaRPr lang="pl-PL" sz="2000" kern="0" dirty="0" smtClean="0">
               <a:ln w="18415" cmpd="sng">
                 <a:noFill/>
                 <a:prstDash val="solid"/>
@@ -9661,7 +10050,7 @@
               <a:defRPr/>
             </a:pPr>
             <a:r>
-              <a:rPr lang="pl-PL" sz="2000" kern="0" smtClean="0">
+              <a:rPr lang="pl-PL" sz="2000" kern="0" dirty="0" smtClean="0">
                 <a:ln w="18415" cmpd="sng">
                   <a:noFill/>
                   <a:prstDash val="solid"/>
@@ -9679,49 +10068,7 @@
                 <a:latin typeface="Times New Roman" pitchFamily="18" charset="0"/>
                 <a:cs typeface="Times New Roman" pitchFamily="18" charset="0"/>
               </a:rPr>
-              <a:t> Držanie AST stromu na strane </a:t>
-            </a:r>
-            <a:r>
-              <a:rPr lang="pl-PL" sz="2000" kern="0" smtClean="0">
-                <a:ln w="18415" cmpd="sng">
-                  <a:noFill/>
-                  <a:prstDash val="solid"/>
-                </a:ln>
-                <a:solidFill>
-                  <a:srgbClr val="FFFFFF"/>
-                </a:solidFill>
-                <a:effectLst>
-                  <a:outerShdw blurRad="50800" dist="38100" dir="2700000" algn="tl" rotWithShape="0">
-                    <a:prstClr val="black">
-                      <a:alpha val="40000"/>
-                    </a:prstClr>
-                  </a:outerShdw>
-                </a:effectLst>
-                <a:latin typeface="Times New Roman" pitchFamily="18" charset="0"/>
-                <a:cs typeface="Times New Roman" pitchFamily="18" charset="0"/>
-              </a:rPr>
-              <a:t>Lua </a:t>
-            </a:r>
-            <a:r>
-              <a:rPr lang="pl-PL" sz="2000" kern="0" smtClean="0">
-                <a:ln w="18415" cmpd="sng">
-                  <a:noFill/>
-                  <a:prstDash val="solid"/>
-                </a:ln>
-                <a:solidFill>
-                  <a:srgbClr val="FFFFFF"/>
-                </a:solidFill>
-                <a:effectLst>
-                  <a:outerShdw blurRad="50800" dist="38100" dir="2700000" algn="tl" rotWithShape="0">
-                    <a:prstClr val="black">
-                      <a:alpha val="40000"/>
-                    </a:prstClr>
-                  </a:outerShdw>
-                </a:effectLst>
-                <a:latin typeface="Times New Roman" pitchFamily="18" charset="0"/>
-                <a:cs typeface="Times New Roman" pitchFamily="18" charset="0"/>
-              </a:rPr>
-              <a:t>– už len dopytovanie na strom z Qt</a:t>
+              <a:t> Držanie AST stromu na strane Lua – už len dopytovanie na strom z Qt</a:t>
             </a:r>
           </a:p>
           <a:p>
@@ -9734,7 +10081,7 @@
               <a:defRPr/>
             </a:pPr>
             <a:r>
-              <a:rPr lang="pl-PL" sz="2000" kern="0" smtClean="0">
+              <a:rPr lang="pl-PL" sz="2000" kern="0" dirty="0" smtClean="0">
                 <a:ln w="18415" cmpd="sng">
                   <a:noFill/>
                   <a:prstDash val="solid"/>
@@ -9752,47 +10099,8 @@
                 <a:latin typeface="Times New Roman" pitchFamily="18" charset="0"/>
                 <a:cs typeface="Times New Roman" pitchFamily="18" charset="0"/>
               </a:rPr>
-              <a:t> Rozšíriť paralelizmus aj na stranu </a:t>
-            </a:r>
-            <a:r>
-              <a:rPr lang="pl-PL" sz="2000" kern="0" smtClean="0">
-                <a:ln w="18415" cmpd="sng">
-                  <a:noFill/>
-                  <a:prstDash val="solid"/>
-                </a:ln>
-                <a:solidFill>
-                  <a:srgbClr val="FFFFFF"/>
-                </a:solidFill>
-                <a:effectLst>
-                  <a:outerShdw blurRad="50800" dist="38100" dir="2700000" algn="tl" rotWithShape="0">
-                    <a:prstClr val="black">
-                      <a:alpha val="40000"/>
-                    </a:prstClr>
-                  </a:outerShdw>
-                </a:effectLst>
-                <a:latin typeface="Times New Roman" pitchFamily="18" charset="0"/>
-                <a:cs typeface="Times New Roman" pitchFamily="18" charset="0"/>
-              </a:rPr>
-              <a:t>Lua</a:t>
-            </a:r>
-            <a:endParaRPr lang="pl-PL" sz="2000" kern="0" smtClean="0">
-              <a:ln w="18415" cmpd="sng">
-                <a:noFill/>
-                <a:prstDash val="solid"/>
-              </a:ln>
-              <a:solidFill>
-                <a:srgbClr val="FFFFFF"/>
-              </a:solidFill>
-              <a:effectLst>
-                <a:outerShdw blurRad="50800" dist="38100" dir="2700000" algn="tl" rotWithShape="0">
-                  <a:prstClr val="black">
-                    <a:alpha val="40000"/>
-                  </a:prstClr>
-                </a:outerShdw>
-              </a:effectLst>
-              <a:latin typeface="Times New Roman" pitchFamily="18" charset="0"/>
-              <a:cs typeface="Times New Roman" pitchFamily="18" charset="0"/>
-            </a:endParaRPr>
+              <a:t> Rozšíriť paralelizmus aj na stranu Lua</a:t>
+            </a:r>
           </a:p>
           <a:p>
             <a:pPr>
@@ -9804,7 +10112,7 @@
               <a:defRPr/>
             </a:pPr>
             <a:r>
-              <a:rPr lang="pl-PL" sz="2000" kern="0" smtClean="0">
+              <a:rPr lang="pl-PL" sz="2000" kern="0" dirty="0" smtClean="0">
                 <a:ln w="18415" cmpd="sng">
                   <a:noFill/>
                   <a:prstDash val="solid"/>
@@ -9822,47 +10130,8 @@
                 <a:latin typeface="Times New Roman" pitchFamily="18" charset="0"/>
                 <a:cs typeface="Times New Roman" pitchFamily="18" charset="0"/>
               </a:rPr>
-              <a:t> Vlastné </a:t>
-            </a:r>
-            <a:r>
-              <a:rPr lang="pl-PL" sz="2000" kern="0" smtClean="0">
-                <a:ln w="18415" cmpd="sng">
-                  <a:noFill/>
-                  <a:prstDash val="solid"/>
-                </a:ln>
-                <a:solidFill>
-                  <a:srgbClr val="FFFFFF"/>
-                </a:solidFill>
-                <a:effectLst>
-                  <a:outerShdw blurRad="50800" dist="38100" dir="2700000" algn="tl" rotWithShape="0">
-                    <a:prstClr val="black">
-                      <a:alpha val="40000"/>
-                    </a:prstClr>
-                  </a:outerShdw>
-                </a:effectLst>
-                <a:latin typeface="Times New Roman" pitchFamily="18" charset="0"/>
-                <a:cs typeface="Times New Roman" pitchFamily="18" charset="0"/>
-              </a:rPr>
-              <a:t>konfigurovateľné shortcuts</a:t>
-            </a:r>
-            <a:endParaRPr lang="pl-PL" sz="2000" kern="0" smtClean="0">
-              <a:ln w="18415" cmpd="sng">
-                <a:noFill/>
-                <a:prstDash val="solid"/>
-              </a:ln>
-              <a:solidFill>
-                <a:srgbClr val="FFFFFF"/>
-              </a:solidFill>
-              <a:effectLst>
-                <a:outerShdw blurRad="50800" dist="38100" dir="2700000" algn="tl" rotWithShape="0">
-                  <a:prstClr val="black">
-                    <a:alpha val="40000"/>
-                  </a:prstClr>
-                </a:outerShdw>
-              </a:effectLst>
-              <a:latin typeface="Times New Roman" pitchFamily="18" charset="0"/>
-              <a:cs typeface="Times New Roman" pitchFamily="18" charset="0"/>
-            </a:endParaRPr>
+              <a:t> Vlastné konfigurovateľné shortcuts</a:t>
+            </a:r>
           </a:p>
           <a:p>
             <a:pPr>
@@ -9874,7 +10143,7 @@
               <a:defRPr/>
             </a:pPr>
             <a:r>
-              <a:rPr lang="pl-PL" sz="2000" kern="0" smtClean="0">
+              <a:rPr lang="pl-PL" sz="2000" kern="0" dirty="0" smtClean="0">
                 <a:ln w="18415" cmpd="sng">
                   <a:noFill/>
                   <a:prstDash val="solid"/>
@@ -9892,7 +10161,91 @@
                 <a:latin typeface="Times New Roman" pitchFamily="18" charset="0"/>
                 <a:cs typeface="Times New Roman" pitchFamily="18" charset="0"/>
               </a:rPr>
-              <a:t> Undo Redo rozšíriť aj pre prácu s blokmi</a:t>
+              <a:t> </a:t>
+            </a:r>
+            <a:r>
+              <a:rPr lang="pl-PL" sz="2000" kern="0" dirty="0" smtClean="0">
+                <a:ln w="18415" cmpd="sng">
+                  <a:noFill/>
+                  <a:prstDash val="solid"/>
+                </a:ln>
+                <a:solidFill>
+                  <a:srgbClr val="FFFFFF"/>
+                </a:solidFill>
+                <a:effectLst>
+                  <a:outerShdw blurRad="50800" dist="38100" dir="2700000" algn="tl" rotWithShape="0">
+                    <a:prstClr val="black">
+                      <a:alpha val="40000"/>
+                    </a:prstClr>
+                  </a:outerShdw>
+                </a:effectLst>
+                <a:latin typeface="Times New Roman" pitchFamily="18" charset="0"/>
+                <a:cs typeface="Times New Roman" pitchFamily="18" charset="0"/>
+              </a:rPr>
+              <a:t>Undo</a:t>
+            </a:r>
+            <a:r>
+              <a:rPr lang="en-US" sz="2000" kern="0" dirty="0" smtClean="0">
+                <a:ln w="18415" cmpd="sng">
+                  <a:noFill/>
+                  <a:prstDash val="solid"/>
+                </a:ln>
+                <a:solidFill>
+                  <a:srgbClr val="FFFFFF"/>
+                </a:solidFill>
+                <a:effectLst>
+                  <a:outerShdw blurRad="50800" dist="38100" dir="2700000" algn="tl" rotWithShape="0">
+                    <a:prstClr val="black">
+                      <a:alpha val="40000"/>
+                    </a:prstClr>
+                  </a:outerShdw>
+                </a:effectLst>
+                <a:latin typeface="Times New Roman" pitchFamily="18" charset="0"/>
+                <a:cs typeface="Times New Roman" pitchFamily="18" charset="0"/>
+              </a:rPr>
+              <a:t>/</a:t>
+            </a:r>
+            <a:r>
+              <a:rPr lang="pl-PL" sz="2000" kern="0" dirty="0" smtClean="0">
+                <a:ln w="18415" cmpd="sng">
+                  <a:noFill/>
+                  <a:prstDash val="solid"/>
+                </a:ln>
+                <a:solidFill>
+                  <a:srgbClr val="FFFFFF"/>
+                </a:solidFill>
+                <a:effectLst>
+                  <a:outerShdw blurRad="50800" dist="38100" dir="2700000" algn="tl" rotWithShape="0">
+                    <a:prstClr val="black">
+                      <a:alpha val="40000"/>
+                    </a:prstClr>
+                  </a:outerShdw>
+                </a:effectLst>
+                <a:latin typeface="Times New Roman" pitchFamily="18" charset="0"/>
+                <a:cs typeface="Times New Roman" pitchFamily="18" charset="0"/>
+              </a:rPr>
+              <a:t>Redo </a:t>
+            </a:r>
+            <a:r>
+              <a:rPr lang="pl-PL" sz="2000" kern="0" dirty="0" smtClean="0">
+                <a:ln w="18415" cmpd="sng">
+                  <a:noFill/>
+                  <a:prstDash val="solid"/>
+                </a:ln>
+                <a:solidFill>
+                  <a:srgbClr val="FFFFFF"/>
+                </a:solidFill>
+                <a:effectLst>
+                  <a:outerShdw blurRad="50800" dist="38100" dir="2700000" algn="tl" rotWithShape="0">
+                    <a:prstClr val="black">
+                      <a:alpha val="40000"/>
+                    </a:prstClr>
+                  </a:outerShdw>
+                </a:effectLst>
+                <a:latin typeface="Times New Roman" pitchFamily="18" charset="0"/>
+                <a:cs typeface="Times New Roman" pitchFamily="18" charset="0"/>
+              </a:rPr>
+              <a:t>rozšíriť aj pre prácu s blokmi</a:t>
             </a:r>
           </a:p>
           <a:p>
@@ -9905,7 +10258,7 @@
               <a:defRPr/>
             </a:pPr>
             <a:r>
-              <a:rPr lang="pl-PL" sz="2000" kern="0" smtClean="0">
+              <a:rPr lang="pl-PL" sz="2000" kern="0" dirty="0" smtClean="0">
                 <a:ln w="18415" cmpd="sng">
                   <a:noFill/>
                   <a:prstDash val="solid"/>
@@ -9926,7 +10279,7 @@
               <a:t> Zabudovanie pokročilého dokumentačného bloku </a:t>
             </a:r>
             <a:r>
-              <a:rPr lang="pl-PL" sz="2000" kern="0" smtClean="0">
+              <a:rPr lang="pl-PL" sz="2000" kern="0" dirty="0" smtClean="0">
                 <a:ln w="18415" cmpd="sng">
                   <a:noFill/>
                   <a:prstDash val="solid"/>
@@ -9944,10 +10297,52 @@
                 <a:latin typeface="Times New Roman" pitchFamily="18" charset="0"/>
                 <a:cs typeface="Times New Roman" pitchFamily="18" charset="0"/>
               </a:rPr>
-              <a:t>podporúceho </a:t>
-            </a:r>
-            <a:r>
-              <a:rPr lang="pl-PL" sz="2000" kern="0" smtClean="0">
+              <a:t>podpor</a:t>
+            </a:r>
+            <a:r>
+              <a:rPr lang="en-US" sz="2000" kern="0" dirty="0" err="1" smtClean="0">
+                <a:ln w="18415" cmpd="sng">
+                  <a:noFill/>
+                  <a:prstDash val="solid"/>
+                </a:ln>
+                <a:solidFill>
+                  <a:srgbClr val="FFFFFF"/>
+                </a:solidFill>
+                <a:effectLst>
+                  <a:outerShdw blurRad="50800" dist="38100" dir="2700000" algn="tl" rotWithShape="0">
+                    <a:prstClr val="black">
+                      <a:alpha val="40000"/>
+                    </a:prstClr>
+                  </a:outerShdw>
+                </a:effectLst>
+                <a:latin typeface="Times New Roman" pitchFamily="18" charset="0"/>
+                <a:cs typeface="Times New Roman" pitchFamily="18" charset="0"/>
+              </a:rPr>
+              <a:t>uj</a:t>
+            </a:r>
+            <a:r>
+              <a:rPr lang="pl-PL" sz="2000" kern="0" dirty="0" smtClean="0">
+                <a:ln w="18415" cmpd="sng">
+                  <a:noFill/>
+                  <a:prstDash val="solid"/>
+                </a:ln>
+                <a:solidFill>
+                  <a:srgbClr val="FFFFFF"/>
+                </a:solidFill>
+                <a:effectLst>
+                  <a:outerShdw blurRad="50800" dist="38100" dir="2700000" algn="tl" rotWithShape="0">
+                    <a:prstClr val="black">
+                      <a:alpha val="40000"/>
+                    </a:prstClr>
+                  </a:outerShdw>
+                </a:effectLst>
+                <a:latin typeface="Times New Roman" pitchFamily="18" charset="0"/>
+                <a:cs typeface="Times New Roman" pitchFamily="18" charset="0"/>
+              </a:rPr>
+              <a:t>úceho </a:t>
+            </a:r>
+            <a:r>
+              <a:rPr lang="pl-PL" sz="2000" kern="0" dirty="0" smtClean="0">
                 <a:ln w="18415" cmpd="sng">
                   <a:noFill/>
                   <a:prstDash val="solid"/>
@@ -10831,7 +11226,7 @@
           <p:nvPr/>
         </p:nvPicPr>
         <p:blipFill>
-          <a:blip r:embed="rId2" cstate="print"/>
+          <a:blip r:embed="rId3" cstate="print"/>
           <a:stretch>
             <a:fillRect/>
           </a:stretch>
@@ -10858,7 +11253,7 @@
           <p:nvPr/>
         </p:nvPicPr>
         <p:blipFill>
-          <a:blip r:embed="rId3" cstate="print"/>
+          <a:blip r:embed="rId4" cstate="print"/>
           <a:srcRect/>
           <a:stretch>
             <a:fillRect/>
@@ -11722,7 +12117,7 @@
               <a:defRPr/>
             </a:pPr>
             <a:r>
-              <a:rPr lang="sk-SK" sz="2000" kern="0" smtClean="0">
+              <a:rPr lang="sk-SK" sz="2000" kern="0" dirty="0" smtClean="0">
                 <a:ln w="18415" cmpd="sng">
                   <a:noFill/>
                   <a:prstDash val="solid"/>
@@ -11743,7 +12138,7 @@
               <a:t> m</a:t>
             </a:r>
             <a:r>
-              <a:rPr lang="en-US" sz="2000" kern="0" smtClean="0">
+              <a:rPr lang="en-US" sz="2000" kern="0" dirty="0" smtClean="0">
                 <a:ln w="18415" cmpd="sng">
                   <a:noFill/>
                   <a:prstDash val="solid"/>
@@ -11764,7 +12159,7 @@
               <a:t>y</a:t>
             </a:r>
             <a:r>
-              <a:rPr lang="sk-SK" sz="2000" kern="0" smtClean="0">
+              <a:rPr lang="sk-SK" sz="2000" kern="0" dirty="0" err="1" smtClean="0">
                 <a:ln w="18415" cmpd="sng">
                   <a:noFill/>
                   <a:prstDash val="solid"/>
@@ -11782,10 +12177,136 @@
                 <a:latin typeface="Times New Roman" pitchFamily="18" charset="0"/>
                 <a:cs typeface="Times New Roman" pitchFamily="18" charset="0"/>
               </a:rPr>
-              <a:t>šlienka vytvoriť multiplatformový gratický editor</a:t>
-            </a:r>
-            <a:r>
-              <a:rPr kumimoji="0" lang="sk-SK" sz="2000" u="none" strike="noStrike" kern="0" cap="none" normalizeH="0" baseline="0" noProof="0" smtClean="0">
+              <a:t>šlienka</a:t>
+            </a:r>
+            <a:r>
+              <a:rPr lang="sk-SK" sz="2000" kern="0" dirty="0" smtClean="0">
+                <a:ln w="18415" cmpd="sng">
+                  <a:noFill/>
+                  <a:prstDash val="solid"/>
+                </a:ln>
+                <a:solidFill>
+                  <a:srgbClr val="FFFFFF"/>
+                </a:solidFill>
+                <a:effectLst>
+                  <a:outerShdw blurRad="50800" dist="38100" dir="2700000" algn="tl" rotWithShape="0">
+                    <a:prstClr val="black">
+                      <a:alpha val="40000"/>
+                    </a:prstClr>
+                  </a:outerShdw>
+                </a:effectLst>
+                <a:latin typeface="Times New Roman" pitchFamily="18" charset="0"/>
+                <a:cs typeface="Times New Roman" pitchFamily="18" charset="0"/>
+              </a:rPr>
+              <a:t> vytvoriť multiplatformový </a:t>
+            </a:r>
+            <a:r>
+              <a:rPr lang="sk-SK" sz="2000" kern="0" dirty="0" err="1" smtClean="0">
+                <a:ln w="18415" cmpd="sng">
+                  <a:noFill/>
+                  <a:prstDash val="solid"/>
+                </a:ln>
+                <a:solidFill>
+                  <a:srgbClr val="FFFFFF"/>
+                </a:solidFill>
+                <a:effectLst>
+                  <a:outerShdw blurRad="50800" dist="38100" dir="2700000" algn="tl" rotWithShape="0">
+                    <a:prstClr val="black">
+                      <a:alpha val="40000"/>
+                    </a:prstClr>
+                  </a:outerShdw>
+                </a:effectLst>
+                <a:latin typeface="Times New Roman" pitchFamily="18" charset="0"/>
+                <a:cs typeface="Times New Roman" pitchFamily="18" charset="0"/>
+              </a:rPr>
+              <a:t>gra</a:t>
+            </a:r>
+            <a:r>
+              <a:rPr lang="en-US" sz="2000" kern="0" dirty="0" smtClean="0">
+                <a:ln w="18415" cmpd="sng">
+                  <a:noFill/>
+                  <a:prstDash val="solid"/>
+                </a:ln>
+                <a:solidFill>
+                  <a:srgbClr val="FFFFFF"/>
+                </a:solidFill>
+                <a:effectLst>
+                  <a:outerShdw blurRad="50800" dist="38100" dir="2700000" algn="tl" rotWithShape="0">
+                    <a:prstClr val="black">
+                      <a:alpha val="40000"/>
+                    </a:prstClr>
+                  </a:outerShdw>
+                </a:effectLst>
+                <a:latin typeface="Times New Roman" pitchFamily="18" charset="0"/>
+                <a:cs typeface="Times New Roman" pitchFamily="18" charset="0"/>
+              </a:rPr>
+              <a:t>f</a:t>
+            </a:r>
+            <a:r>
+              <a:rPr lang="sk-SK" sz="2000" kern="0" dirty="0" err="1" smtClean="0">
+                <a:ln w="18415" cmpd="sng">
+                  <a:noFill/>
+                  <a:prstDash val="solid"/>
+                </a:ln>
+                <a:solidFill>
+                  <a:srgbClr val="FFFFFF"/>
+                </a:solidFill>
+                <a:effectLst>
+                  <a:outerShdw blurRad="50800" dist="38100" dir="2700000" algn="tl" rotWithShape="0">
+                    <a:prstClr val="black">
+                      <a:alpha val="40000"/>
+                    </a:prstClr>
+                  </a:outerShdw>
+                </a:effectLst>
+                <a:latin typeface="Times New Roman" pitchFamily="18" charset="0"/>
+                <a:cs typeface="Times New Roman" pitchFamily="18" charset="0"/>
+              </a:rPr>
+              <a:t>ický</a:t>
+            </a:r>
+            <a:r>
+              <a:rPr lang="sk-SK" sz="2000" kern="0" dirty="0" smtClean="0">
+                <a:ln w="18415" cmpd="sng">
+                  <a:noFill/>
+                  <a:prstDash val="solid"/>
+                </a:ln>
+                <a:solidFill>
+                  <a:srgbClr val="FFFFFF"/>
+                </a:solidFill>
+                <a:effectLst>
+                  <a:outerShdw blurRad="50800" dist="38100" dir="2700000" algn="tl" rotWithShape="0">
+                    <a:prstClr val="black">
+                      <a:alpha val="40000"/>
+                    </a:prstClr>
+                  </a:outerShdw>
+                </a:effectLst>
+                <a:latin typeface="Times New Roman" pitchFamily="18" charset="0"/>
+                <a:cs typeface="Times New Roman" pitchFamily="18" charset="0"/>
+              </a:rPr>
+              <a:t> </a:t>
+            </a:r>
+            <a:r>
+              <a:rPr lang="sk-SK" sz="2000" kern="0" dirty="0" smtClean="0">
+                <a:ln w="18415" cmpd="sng">
+                  <a:noFill/>
+                  <a:prstDash val="solid"/>
+                </a:ln>
+                <a:solidFill>
+                  <a:srgbClr val="FFFFFF"/>
+                </a:solidFill>
+                <a:effectLst>
+                  <a:outerShdw blurRad="50800" dist="38100" dir="2700000" algn="tl" rotWithShape="0">
+                    <a:prstClr val="black">
+                      <a:alpha val="40000"/>
+                    </a:prstClr>
+                  </a:outerShdw>
+                </a:effectLst>
+                <a:latin typeface="Times New Roman" pitchFamily="18" charset="0"/>
+                <a:cs typeface="Times New Roman" pitchFamily="18" charset="0"/>
+              </a:rPr>
+              <a:t>editor</a:t>
+            </a:r>
+            <a:r>
+              <a:rPr kumimoji="0" lang="sk-SK" sz="2000" u="none" strike="noStrike" kern="0" cap="none" normalizeH="0" baseline="0" noProof="0" dirty="0" smtClean="0">
                 <a:ln w="18415" cmpd="sng">
                   <a:noFill/>
                   <a:prstDash val="solid"/>
@@ -11818,7 +12339,7 @@
               <a:defRPr/>
             </a:pPr>
             <a:r>
-              <a:rPr lang="sk-SK" sz="2000" kern="0" smtClean="0">
+              <a:rPr lang="sk-SK" sz="2000" kern="0" dirty="0" smtClean="0">
                 <a:ln w="18415" cmpd="sng">
                   <a:noFill/>
                   <a:prstDash val="solid"/>
@@ -11849,7 +12370,7 @@
               <a:defRPr/>
             </a:pPr>
             <a:r>
-              <a:rPr lang="sk-SK" sz="2000" kern="0" smtClean="0">
+              <a:rPr lang="sk-SK" sz="2000" kern="0" dirty="0" smtClean="0">
                 <a:ln w="18415" cmpd="sng">
                   <a:noFill/>
                   <a:prstDash val="solid"/>
@@ -11867,7 +12388,28 @@
                 <a:latin typeface="Times New Roman" pitchFamily="18" charset="0"/>
                 <a:cs typeface="Times New Roman" pitchFamily="18" charset="0"/>
               </a:rPr>
-              <a:t> podporiť myšlienku „literate programming“</a:t>
+              <a:t> </a:t>
+            </a:r>
+            <a:r>
+              <a:rPr lang="sk-SK" sz="2000" kern="0" dirty="0" smtClean="0">
+                <a:ln w="18415" cmpd="sng">
+                  <a:noFill/>
+                  <a:prstDash val="solid"/>
+                </a:ln>
+                <a:solidFill>
+                  <a:srgbClr val="FFFFFF"/>
+                </a:solidFill>
+                <a:effectLst>
+                  <a:outerShdw blurRad="50800" dist="38100" dir="2700000" algn="tl" rotWithShape="0">
+                    <a:prstClr val="black">
+                      <a:alpha val="40000"/>
+                    </a:prstClr>
+                  </a:outerShdw>
+                </a:effectLst>
+                <a:latin typeface="Times New Roman" pitchFamily="18" charset="0"/>
+                <a:cs typeface="Times New Roman" pitchFamily="18" charset="0"/>
+              </a:rPr>
+              <a:t>uľahčiť a urýchliť manipuláciu so zdrojovým kódom</a:t>
             </a:r>
           </a:p>
           <a:p>
@@ -11880,7 +12422,7 @@
               <a:defRPr/>
             </a:pPr>
             <a:r>
-              <a:rPr kumimoji="0" lang="sk-SK" sz="2000" u="none" strike="noStrike" kern="0" cap="none" normalizeH="0" baseline="0" noProof="0" smtClean="0">
+              <a:rPr lang="sk-SK" sz="2000" kern="0" dirty="0" smtClean="0">
                 <a:ln w="18415" cmpd="sng">
                   <a:noFill/>
                   <a:prstDash val="solid"/>
@@ -11895,6 +12437,142 @@
                     </a:prstClr>
                   </a:outerShdw>
                 </a:effectLst>
+                <a:latin typeface="Times New Roman" pitchFamily="18" charset="0"/>
+                <a:cs typeface="Times New Roman" pitchFamily="18" charset="0"/>
+              </a:rPr>
+              <a:t> podporiť </a:t>
+            </a:r>
+            <a:r>
+              <a:rPr lang="sk-SK" sz="2000" kern="0" dirty="0" smtClean="0">
+                <a:ln w="18415" cmpd="sng">
+                  <a:noFill/>
+                  <a:prstDash val="solid"/>
+                </a:ln>
+                <a:solidFill>
+                  <a:srgbClr val="FFFFFF"/>
+                </a:solidFill>
+                <a:effectLst>
+                  <a:outerShdw blurRad="50800" dist="38100" dir="2700000" algn="tl" rotWithShape="0">
+                    <a:prstClr val="black">
+                      <a:alpha val="40000"/>
+                    </a:prstClr>
+                  </a:outerShdw>
+                </a:effectLst>
+                <a:latin typeface="Times New Roman" pitchFamily="18" charset="0"/>
+                <a:cs typeface="Times New Roman" pitchFamily="18" charset="0"/>
+              </a:rPr>
+              <a:t>myšlienku „</a:t>
+            </a:r>
+            <a:r>
+              <a:rPr lang="sk-SK" sz="2000" kern="0" dirty="0" err="1" smtClean="0">
+                <a:ln w="18415" cmpd="sng">
+                  <a:noFill/>
+                  <a:prstDash val="solid"/>
+                </a:ln>
+                <a:solidFill>
+                  <a:srgbClr val="FFFFFF"/>
+                </a:solidFill>
+                <a:effectLst>
+                  <a:outerShdw blurRad="50800" dist="38100" dir="2700000" algn="tl" rotWithShape="0">
+                    <a:prstClr val="black">
+                      <a:alpha val="40000"/>
+                    </a:prstClr>
+                  </a:outerShdw>
+                </a:effectLst>
+                <a:latin typeface="Times New Roman" pitchFamily="18" charset="0"/>
+                <a:cs typeface="Times New Roman" pitchFamily="18" charset="0"/>
+              </a:rPr>
+              <a:t>literate</a:t>
+            </a:r>
+            <a:r>
+              <a:rPr lang="sk-SK" sz="2000" kern="0" dirty="0" smtClean="0">
+                <a:ln w="18415" cmpd="sng">
+                  <a:noFill/>
+                  <a:prstDash val="solid"/>
+                </a:ln>
+                <a:solidFill>
+                  <a:srgbClr val="FFFFFF"/>
+                </a:solidFill>
+                <a:effectLst>
+                  <a:outerShdw blurRad="50800" dist="38100" dir="2700000" algn="tl" rotWithShape="0">
+                    <a:prstClr val="black">
+                      <a:alpha val="40000"/>
+                    </a:prstClr>
+                  </a:outerShdw>
+                </a:effectLst>
+                <a:latin typeface="Times New Roman" pitchFamily="18" charset="0"/>
+                <a:cs typeface="Times New Roman" pitchFamily="18" charset="0"/>
+              </a:rPr>
+              <a:t> </a:t>
+            </a:r>
+            <a:r>
+              <a:rPr lang="sk-SK" sz="2000" kern="0" dirty="0" err="1" smtClean="0">
+                <a:ln w="18415" cmpd="sng">
+                  <a:noFill/>
+                  <a:prstDash val="solid"/>
+                </a:ln>
+                <a:solidFill>
+                  <a:srgbClr val="FFFFFF"/>
+                </a:solidFill>
+                <a:effectLst>
+                  <a:outerShdw blurRad="50800" dist="38100" dir="2700000" algn="tl" rotWithShape="0">
+                    <a:prstClr val="black">
+                      <a:alpha val="40000"/>
+                    </a:prstClr>
+                  </a:outerShdw>
+                </a:effectLst>
+                <a:latin typeface="Times New Roman" pitchFamily="18" charset="0"/>
+                <a:cs typeface="Times New Roman" pitchFamily="18" charset="0"/>
+              </a:rPr>
+              <a:t>programming</a:t>
+            </a:r>
+            <a:r>
+              <a:rPr lang="sk-SK" sz="2000" kern="0" dirty="0" smtClean="0">
+                <a:ln w="18415" cmpd="sng">
+                  <a:noFill/>
+                  <a:prstDash val="solid"/>
+                </a:ln>
+                <a:solidFill>
+                  <a:srgbClr val="FFFFFF"/>
+                </a:solidFill>
+                <a:effectLst>
+                  <a:outerShdw blurRad="50800" dist="38100" dir="2700000" algn="tl" rotWithShape="0">
+                    <a:prstClr val="black">
+                      <a:alpha val="40000"/>
+                    </a:prstClr>
+                  </a:outerShdw>
+                </a:effectLst>
+                <a:latin typeface="Times New Roman" pitchFamily="18" charset="0"/>
+                <a:cs typeface="Times New Roman" pitchFamily="18" charset="0"/>
+              </a:rPr>
+              <a:t>“</a:t>
+            </a:r>
+          </a:p>
+          <a:p>
+            <a:pPr lvl="0">
+              <a:lnSpc>
+                <a:spcPct val="150000"/>
+              </a:lnSpc>
+              <a:buFont typeface="Arial" pitchFamily="34" charset="0"/>
+              <a:buChar char="•"/>
+              <a:defRPr/>
+            </a:pPr>
+            <a:r>
+              <a:rPr kumimoji="0" lang="sk-SK" sz="2000" u="none" strike="noStrike" kern="0" cap="none" normalizeH="0" baseline="0" noProof="0" dirty="0" smtClean="0">
+                <a:ln w="18415" cmpd="sng">
+                  <a:noFill/>
+                  <a:prstDash val="solid"/>
+                </a:ln>
+                <a:solidFill>
+                  <a:srgbClr val="FFFFFF"/>
+                </a:solidFill>
+                <a:effectLst>
+                  <a:outerShdw blurRad="50800" dist="38100" dir="2700000" algn="tl" rotWithShape="0">
+                    <a:prstClr val="black">
+                      <a:alpha val="40000"/>
+                    </a:prstClr>
+                  </a:outerShdw>
+                </a:effectLst>
                 <a:uLnTx/>
                 <a:uFillTx/>
                 <a:latin typeface="Times New Roman" pitchFamily="18" charset="0"/>
@@ -11903,7 +12581,7 @@
               <a:t> málo podobných riešení na súčasnom</a:t>
             </a:r>
             <a:r>
-              <a:rPr kumimoji="0" lang="sk-SK" sz="2000" u="none" strike="noStrike" kern="0" cap="none" normalizeH="0" noProof="0" smtClean="0">
+              <a:rPr kumimoji="0" lang="sk-SK" sz="2000" u="none" strike="noStrike" kern="0" cap="none" normalizeH="0" noProof="0" dirty="0" smtClean="0">
                 <a:ln w="18415" cmpd="sng">
                   <a:noFill/>
                   <a:prstDash val="solid"/>
@@ -11923,17 +12601,32 @@
                 <a:latin typeface="Times New Roman" pitchFamily="18" charset="0"/>
                 <a:cs typeface="Times New Roman" pitchFamily="18" charset="0"/>
               </a:rPr>
-              <a:t> trhu</a:t>
-            </a:r>
-          </a:p>
-          <a:p>
-            <a:pPr lvl="0">
-              <a:lnSpc>
-                <a:spcPct val="150000"/>
-              </a:lnSpc>
-              <a:defRPr/>
-            </a:pPr>
-            <a:endParaRPr kumimoji="0" lang="sk-SK" sz="2000" u="none" strike="noStrike" kern="0" cap="none" normalizeH="0" noProof="0" smtClean="0">
+              <a:t> </a:t>
+            </a:r>
+            <a:r>
+              <a:rPr kumimoji="0" lang="sk-SK" sz="2000" u="none" strike="noStrike" kern="0" cap="none" normalizeH="0" noProof="0" dirty="0" smtClean="0">
+                <a:ln w="18415" cmpd="sng">
+                  <a:noFill/>
+                  <a:prstDash val="solid"/>
+                </a:ln>
+                <a:solidFill>
+                  <a:srgbClr val="FFFFFF"/>
+                </a:solidFill>
+                <a:effectLst>
+                  <a:outerShdw blurRad="50800" dist="38100" dir="2700000" algn="tl" rotWithShape="0">
+                    <a:prstClr val="black">
+                      <a:alpha val="40000"/>
+                    </a:prstClr>
+                  </a:outerShdw>
+                </a:effectLst>
+                <a:uLnTx/>
+                <a:uFillTx/>
+                <a:latin typeface="Times New Roman" pitchFamily="18" charset="0"/>
+                <a:cs typeface="Times New Roman" pitchFamily="18" charset="0"/>
+              </a:rPr>
+              <a:t>trhu</a:t>
+            </a:r>
+            <a:endParaRPr kumimoji="0" lang="sk-SK" sz="2000" u="none" strike="noStrike" kern="0" cap="none" normalizeH="0" noProof="0" dirty="0" smtClean="0">
               <a:ln w="18415" cmpd="sng">
                 <a:noFill/>
                 <a:prstDash val="solid"/>
@@ -11964,7 +12657,7 @@
               <a:defRPr/>
             </a:pPr>
             <a:r>
-              <a:rPr lang="en-US" sz="2000" kern="0" smtClean="0">
+              <a:rPr lang="en-US" sz="2000" kern="0" dirty="0" smtClean="0">
                 <a:ln w="18415" cmpd="sng">
                   <a:noFill/>
                   <a:prstDash val="solid"/>
@@ -11985,7 +12678,7 @@
               <a:t> </a:t>
             </a:r>
             <a:r>
-              <a:rPr lang="sk-SK" sz="2000" kern="0" smtClean="0">
+              <a:rPr lang="sk-SK" sz="2000" kern="0" dirty="0" smtClean="0">
                 <a:ln w="18415" cmpd="sng">
                   <a:noFill/>
                   <a:prstDash val="solid"/>
@@ -12016,7 +12709,7 @@
               <a:defRPr/>
             </a:pPr>
             <a:r>
-              <a:rPr lang="sk-SK" sz="2000" kern="0" smtClean="0">
+              <a:rPr lang="sk-SK" sz="2000" kern="0" dirty="0" smtClean="0">
                 <a:ln w="18415" cmpd="sng">
                   <a:noFill/>
                   <a:prstDash val="solid"/>
@@ -12821,7 +13514,7 @@
         <p:spPr>
           <a:xfrm>
             <a:off x="428596" y="1285864"/>
-            <a:ext cx="8286808" cy="2769989"/>
+            <a:ext cx="8286808" cy="3231654"/>
           </a:xfrm>
           <a:prstGeom prst="rect">
             <a:avLst/>
@@ -12843,7 +13536,7 @@
               <a:defRPr/>
             </a:pPr>
             <a:r>
-              <a:rPr lang="en-US" sz="2000" kern="0" smtClean="0">
+              <a:rPr lang="en-US" sz="2000" kern="0" dirty="0" smtClean="0">
                 <a:ln w="18415" cmpd="sng">
                   <a:noFill/>
                   <a:prstDash val="solid"/>
@@ -12864,7 +13557,7 @@
               <a:t> </a:t>
             </a:r>
             <a:r>
-              <a:rPr lang="sk-SK" sz="2000" kern="0" smtClean="0">
+              <a:rPr lang="sk-SK" sz="2000" kern="0" dirty="0" smtClean="0">
                 <a:ln w="18415" cmpd="sng">
                   <a:noFill/>
                   <a:prstDash val="solid"/>
@@ -12895,7 +13588,7 @@
               <a:defRPr/>
             </a:pPr>
             <a:r>
-              <a:rPr kumimoji="0" lang="en-US" sz="2000" u="none" strike="noStrike" kern="0" cap="none" normalizeH="0" baseline="0" noProof="0" smtClean="0">
+              <a:rPr kumimoji="0" lang="en-US" sz="2000" u="none" strike="noStrike" kern="0" cap="none" normalizeH="0" baseline="0" noProof="0" dirty="0" smtClean="0">
                 <a:ln w="18415" cmpd="sng">
                   <a:noFill/>
                   <a:prstDash val="solid"/>
@@ -12918,7 +13611,7 @@
               <a:t> </a:t>
             </a:r>
             <a:r>
-              <a:rPr kumimoji="0" lang="sk-SK" sz="2000" u="none" strike="noStrike" kern="0" cap="none" normalizeH="0" baseline="0" noProof="0" smtClean="0">
+              <a:rPr kumimoji="0" lang="sk-SK" sz="2000" u="none" strike="noStrike" kern="0" cap="none" normalizeH="0" baseline="0" noProof="0" dirty="0" smtClean="0">
                 <a:ln w="18415" cmpd="sng">
                   <a:noFill/>
                   <a:prstDash val="solid"/>
@@ -12941,7 +13634,7 @@
               <a:t>doplnenie editora o ďalšie</a:t>
             </a:r>
             <a:r>
-              <a:rPr kumimoji="0" lang="sk-SK" sz="2000" u="none" strike="noStrike" kern="0" cap="none" normalizeH="0" noProof="0" smtClean="0">
+              <a:rPr kumimoji="0" lang="sk-SK" sz="2000" u="none" strike="noStrike" kern="0" cap="none" normalizeH="0" noProof="0" dirty="0" smtClean="0">
                 <a:ln w="18415" cmpd="sng">
                   <a:noFill/>
                   <a:prstDash val="solid"/>
@@ -12961,7 +13654,30 @@
                 <a:latin typeface="Times New Roman" pitchFamily="18" charset="0"/>
                 <a:cs typeface="Times New Roman" pitchFamily="18" charset="0"/>
               </a:rPr>
-              <a:t> špecifikované funkcionality</a:t>
+              <a:t> špecifikované </a:t>
+            </a:r>
+            <a:r>
+              <a:rPr kumimoji="0" lang="sk-SK" sz="2000" u="none" strike="noStrike" kern="0" cap="none" normalizeH="0" noProof="0" dirty="0" smtClean="0">
+                <a:ln w="18415" cmpd="sng">
+                  <a:noFill/>
+                  <a:prstDash val="solid"/>
+                </a:ln>
+                <a:solidFill>
+                  <a:srgbClr val="FFFFFF"/>
+                </a:solidFill>
+                <a:effectLst>
+                  <a:outerShdw blurRad="50800" dist="38100" dir="2700000" algn="tl" rotWithShape="0">
+                    <a:prstClr val="black">
+                      <a:alpha val="40000"/>
+                    </a:prstClr>
+                  </a:outerShdw>
+                </a:effectLst>
+                <a:uLnTx/>
+                <a:uFillTx/>
+                <a:latin typeface="Times New Roman" pitchFamily="18" charset="0"/>
+                <a:cs typeface="Times New Roman" pitchFamily="18" charset="0"/>
+              </a:rPr>
+              <a:t>funkcionality</a:t>
             </a:r>
           </a:p>
           <a:p>
@@ -12974,7 +13690,7 @@
               <a:defRPr/>
             </a:pPr>
             <a:r>
-              <a:rPr lang="en-US" sz="2000" kern="0" baseline="0" smtClean="0">
+              <a:rPr lang="sk-SK" sz="2000" kern="0" noProof="0" dirty="0" smtClean="0">
                 <a:ln w="18415" cmpd="sng">
                   <a:noFill/>
                   <a:prstDash val="solid"/>
@@ -12992,50 +13708,28 @@
                 <a:latin typeface="Times New Roman" pitchFamily="18" charset="0"/>
                 <a:cs typeface="Times New Roman" pitchFamily="18" charset="0"/>
               </a:rPr>
-              <a:t> modern</a:t>
-            </a:r>
-            <a:r>
-              <a:rPr lang="sk-SK" sz="2000" kern="0" baseline="0" smtClean="0">
-                <a:ln w="18415" cmpd="sng">
-                  <a:noFill/>
-                  <a:prstDash val="solid"/>
-                </a:ln>
-                <a:solidFill>
-                  <a:srgbClr val="FFFFFF"/>
-                </a:solidFill>
-                <a:effectLst>
-                  <a:outerShdw blurRad="50800" dist="38100" dir="2700000" algn="tl" rotWithShape="0">
-                    <a:prstClr val="black">
-                      <a:alpha val="40000"/>
-                    </a:prstClr>
-                  </a:outerShdw>
-                </a:effectLst>
-                <a:latin typeface="Times New Roman" pitchFamily="18" charset="0"/>
-                <a:cs typeface="Times New Roman" pitchFamily="18" charset="0"/>
-              </a:rPr>
-              <a:t>é</a:t>
-            </a:r>
-            <a:r>
-              <a:rPr lang="sk-SK" sz="2000" kern="0" smtClean="0">
-                <a:ln w="18415" cmpd="sng">
-                  <a:noFill/>
-                  <a:prstDash val="solid"/>
-                </a:ln>
-                <a:solidFill>
-                  <a:srgbClr val="FFFFFF"/>
-                </a:solidFill>
-                <a:effectLst>
-                  <a:outerShdw blurRad="50800" dist="38100" dir="2700000" algn="tl" rotWithShape="0">
-                    <a:prstClr val="black">
-                      <a:alpha val="40000"/>
-                    </a:prstClr>
-                  </a:outerShdw>
-                </a:effectLst>
-                <a:latin typeface="Times New Roman" pitchFamily="18" charset="0"/>
-                <a:cs typeface="Times New Roman" pitchFamily="18" charset="0"/>
-              </a:rPr>
-              <a:t> používateľské rozhranie</a:t>
-            </a:r>
+              <a:t> zefektívnenie výpočtovo náročných operácií</a:t>
+            </a:r>
+            <a:endParaRPr kumimoji="0" lang="sk-SK" sz="2000" u="none" strike="noStrike" kern="0" cap="none" normalizeH="0" noProof="0" dirty="0" smtClean="0">
+              <a:ln w="18415" cmpd="sng">
+                <a:noFill/>
+                <a:prstDash val="solid"/>
+              </a:ln>
+              <a:solidFill>
+                <a:srgbClr val="FFFFFF"/>
+              </a:solidFill>
+              <a:effectLst>
+                <a:outerShdw blurRad="50800" dist="38100" dir="2700000" algn="tl" rotWithShape="0">
+                  <a:prstClr val="black">
+                    <a:alpha val="40000"/>
+                  </a:prstClr>
+                </a:outerShdw>
+              </a:effectLst>
+              <a:uLnTx/>
+              <a:uFillTx/>
+              <a:latin typeface="Times New Roman" pitchFamily="18" charset="0"/>
+              <a:cs typeface="Times New Roman" pitchFamily="18" charset="0"/>
+            </a:endParaRPr>
           </a:p>
           <a:p>
             <a:pPr>
@@ -13047,7 +13741,7 @@
               <a:defRPr/>
             </a:pPr>
             <a:r>
-              <a:rPr lang="sk-SK" sz="2000" kern="0" smtClean="0">
+              <a:rPr lang="en-US" sz="2000" kern="0" baseline="0" dirty="0" smtClean="0">
                 <a:ln w="18415" cmpd="sng">
                   <a:noFill/>
                   <a:prstDash val="solid"/>
@@ -13065,8 +13759,68 @@
                 <a:latin typeface="Times New Roman" pitchFamily="18" charset="0"/>
                 <a:cs typeface="Times New Roman" pitchFamily="18" charset="0"/>
               </a:rPr>
-              <a:t> nasadenia editora pre reálne využitie v praxi</a:t>
-            </a:r>
+              <a:t> </a:t>
+            </a:r>
+            <a:r>
+              <a:rPr lang="sk-SK" sz="2000" kern="0" baseline="0" dirty="0" smtClean="0">
+                <a:ln w="18415" cmpd="sng">
+                  <a:noFill/>
+                  <a:prstDash val="solid"/>
+                </a:ln>
+                <a:solidFill>
+                  <a:srgbClr val="FFFFFF"/>
+                </a:solidFill>
+                <a:effectLst>
+                  <a:outerShdw blurRad="50800" dist="38100" dir="2700000" algn="tl" rotWithShape="0">
+                    <a:prstClr val="black">
+                      <a:alpha val="40000"/>
+                    </a:prstClr>
+                  </a:outerShdw>
+                </a:effectLst>
+                <a:latin typeface="Times New Roman" pitchFamily="18" charset="0"/>
+                <a:cs typeface="Times New Roman" pitchFamily="18" charset="0"/>
+              </a:rPr>
+              <a:t>vytvorenie</a:t>
+            </a:r>
+            <a:r>
+              <a:rPr lang="sk-SK" sz="2000" kern="0" dirty="0" smtClean="0">
+                <a:ln w="18415" cmpd="sng">
+                  <a:noFill/>
+                  <a:prstDash val="solid"/>
+                </a:ln>
+                <a:solidFill>
+                  <a:srgbClr val="FFFFFF"/>
+                </a:solidFill>
+                <a:effectLst>
+                  <a:outerShdw blurRad="50800" dist="38100" dir="2700000" algn="tl" rotWithShape="0">
+                    <a:prstClr val="black">
+                      <a:alpha val="40000"/>
+                    </a:prstClr>
+                  </a:outerShdw>
+                </a:effectLst>
+                <a:latin typeface="Times New Roman" pitchFamily="18" charset="0"/>
+                <a:cs typeface="Times New Roman" pitchFamily="18" charset="0"/>
+              </a:rPr>
+              <a:t> plnohodnotného editora </a:t>
+            </a:r>
+            <a:endParaRPr lang="sk-SK" sz="2000" kern="0" dirty="0" smtClean="0">
+              <a:ln w="18415" cmpd="sng">
+                <a:noFill/>
+                <a:prstDash val="solid"/>
+              </a:ln>
+              <a:solidFill>
+                <a:srgbClr val="FFFFFF"/>
+              </a:solidFill>
+              <a:effectLst>
+                <a:outerShdw blurRad="50800" dist="38100" dir="2700000" algn="tl" rotWithShape="0">
+                  <a:prstClr val="black">
+                    <a:alpha val="40000"/>
+                  </a:prstClr>
+                </a:outerShdw>
+              </a:effectLst>
+              <a:latin typeface="Times New Roman" pitchFamily="18" charset="0"/>
+              <a:cs typeface="Times New Roman" pitchFamily="18" charset="0"/>
+            </a:endParaRPr>
           </a:p>
           <a:p>
             <a:pPr>
@@ -13078,7 +13832,7 @@
               <a:defRPr/>
             </a:pPr>
             <a:r>
-              <a:rPr lang="sk-SK" sz="2000" kern="0" smtClean="0">
+              <a:rPr lang="sk-SK" sz="2000" kern="0" dirty="0" smtClean="0">
                 <a:ln w="18415" cmpd="sng">
                   <a:noFill/>
                   <a:prstDash val="solid"/>
@@ -13096,7 +13850,7 @@
                 <a:latin typeface="Times New Roman" pitchFamily="18" charset="0"/>
                 <a:cs typeface="Times New Roman" pitchFamily="18" charset="0"/>
               </a:rPr>
-              <a:t>čo možno najväčšia konfigurovateľnosť podľa potrieb používateľa</a:t>
+              <a:t> nasadenia editora pre reálne využitie v praxi</a:t>
             </a:r>
           </a:p>
           <a:p>
@@ -13109,7 +13863,7 @@
               <a:defRPr/>
             </a:pPr>
             <a:r>
-              <a:rPr lang="sk-SK" sz="2000" kern="0" smtClean="0">
+              <a:rPr lang="sk-SK" sz="2000" kern="0" dirty="0" smtClean="0">
                 <a:ln w="18415" cmpd="sng">
                   <a:noFill/>
                   <a:prstDash val="solid"/>
@@ -13127,7 +13881,290 @@
                 <a:latin typeface="Times New Roman" pitchFamily="18" charset="0"/>
                 <a:cs typeface="Times New Roman" pitchFamily="18" charset="0"/>
               </a:rPr>
-              <a:t> používateľský prívetíve rozhranie, ktoré by uľahčovaľo prácu s textom</a:t>
+              <a:t> čo </a:t>
+            </a:r>
+            <a:r>
+              <a:rPr lang="sk-SK" sz="2000" kern="0" dirty="0" smtClean="0">
+                <a:ln w="18415" cmpd="sng">
+                  <a:noFill/>
+                  <a:prstDash val="solid"/>
+                </a:ln>
+                <a:solidFill>
+                  <a:srgbClr val="FFFFFF"/>
+                </a:solidFill>
+                <a:effectLst>
+                  <a:outerShdw blurRad="50800" dist="38100" dir="2700000" algn="tl" rotWithShape="0">
+                    <a:prstClr val="black">
+                      <a:alpha val="40000"/>
+                    </a:prstClr>
+                  </a:outerShdw>
+                </a:effectLst>
+                <a:latin typeface="Times New Roman" pitchFamily="18" charset="0"/>
+                <a:cs typeface="Times New Roman" pitchFamily="18" charset="0"/>
+              </a:rPr>
+              <a:t>možno najväčšia </a:t>
+            </a:r>
+            <a:r>
+              <a:rPr lang="sk-SK" sz="2000" kern="0" dirty="0" err="1" smtClean="0">
+                <a:ln w="18415" cmpd="sng">
+                  <a:noFill/>
+                  <a:prstDash val="solid"/>
+                </a:ln>
+                <a:solidFill>
+                  <a:srgbClr val="FFFFFF"/>
+                </a:solidFill>
+                <a:effectLst>
+                  <a:outerShdw blurRad="50800" dist="38100" dir="2700000" algn="tl" rotWithShape="0">
+                    <a:prstClr val="black">
+                      <a:alpha val="40000"/>
+                    </a:prstClr>
+                  </a:outerShdw>
+                </a:effectLst>
+                <a:latin typeface="Times New Roman" pitchFamily="18" charset="0"/>
+                <a:cs typeface="Times New Roman" pitchFamily="18" charset="0"/>
+              </a:rPr>
+              <a:t>konfigurovateľnosť</a:t>
+            </a:r>
+            <a:r>
+              <a:rPr lang="sk-SK" sz="2000" kern="0" dirty="0" smtClean="0">
+                <a:ln w="18415" cmpd="sng">
+                  <a:noFill/>
+                  <a:prstDash val="solid"/>
+                </a:ln>
+                <a:solidFill>
+                  <a:srgbClr val="FFFFFF"/>
+                </a:solidFill>
+                <a:effectLst>
+                  <a:outerShdw blurRad="50800" dist="38100" dir="2700000" algn="tl" rotWithShape="0">
+                    <a:prstClr val="black">
+                      <a:alpha val="40000"/>
+                    </a:prstClr>
+                  </a:outerShdw>
+                </a:effectLst>
+                <a:latin typeface="Times New Roman" pitchFamily="18" charset="0"/>
+                <a:cs typeface="Times New Roman" pitchFamily="18" charset="0"/>
+              </a:rPr>
+              <a:t> podľa potrieb používateľa</a:t>
+            </a:r>
+          </a:p>
+          <a:p>
+            <a:pPr>
+              <a:lnSpc>
+                <a:spcPct val="150000"/>
+              </a:lnSpc>
+              <a:buFont typeface="Arial" pitchFamily="34" charset="0"/>
+              <a:buChar char="•"/>
+              <a:defRPr/>
+            </a:pPr>
+            <a:r>
+              <a:rPr lang="sk-SK" sz="2000" kern="0" dirty="0" smtClean="0">
+                <a:ln w="18415" cmpd="sng">
+                  <a:noFill/>
+                  <a:prstDash val="solid"/>
+                </a:ln>
+                <a:solidFill>
+                  <a:srgbClr val="FFFFFF"/>
+                </a:solidFill>
+                <a:effectLst>
+                  <a:outerShdw blurRad="50800" dist="38100" dir="2700000" algn="tl" rotWithShape="0">
+                    <a:prstClr val="black">
+                      <a:alpha val="40000"/>
+                    </a:prstClr>
+                  </a:outerShdw>
+                </a:effectLst>
+                <a:latin typeface="Times New Roman" pitchFamily="18" charset="0"/>
+                <a:cs typeface="Times New Roman" pitchFamily="18" charset="0"/>
+              </a:rPr>
+              <a:t> </a:t>
+            </a:r>
+            <a:r>
+              <a:rPr lang="sk-SK" sz="2000" kern="0" dirty="0" err="1" smtClean="0">
+                <a:ln w="18415" cmpd="sng">
+                  <a:noFill/>
+                  <a:prstDash val="solid"/>
+                </a:ln>
+                <a:solidFill>
+                  <a:srgbClr val="FFFFFF"/>
+                </a:solidFill>
+                <a:effectLst>
+                  <a:outerShdw blurRad="50800" dist="38100" dir="2700000" algn="tl" rotWithShape="0">
+                    <a:prstClr val="black">
+                      <a:alpha val="40000"/>
+                    </a:prstClr>
+                  </a:outerShdw>
+                </a:effectLst>
+                <a:latin typeface="Times New Roman" pitchFamily="18" charset="0"/>
+                <a:cs typeface="Times New Roman" pitchFamily="18" charset="0"/>
+              </a:rPr>
+              <a:t>používateľsk</a:t>
+            </a:r>
+            <a:r>
+              <a:rPr lang="en-US" sz="2000" kern="0" dirty="0" smtClean="0">
+                <a:ln w="18415" cmpd="sng">
+                  <a:noFill/>
+                  <a:prstDash val="solid"/>
+                </a:ln>
+                <a:solidFill>
+                  <a:srgbClr val="FFFFFF"/>
+                </a:solidFill>
+                <a:effectLst>
+                  <a:outerShdw blurRad="50800" dist="38100" dir="2700000" algn="tl" rotWithShape="0">
+                    <a:prstClr val="black">
+                      <a:alpha val="40000"/>
+                    </a:prstClr>
+                  </a:outerShdw>
+                </a:effectLst>
+                <a:latin typeface="Times New Roman" pitchFamily="18" charset="0"/>
+                <a:cs typeface="Times New Roman" pitchFamily="18" charset="0"/>
+              </a:rPr>
+              <a:t>y</a:t>
+            </a:r>
+            <a:r>
+              <a:rPr lang="sk-SK" sz="2000" kern="0" dirty="0" smtClean="0">
+                <a:ln w="18415" cmpd="sng">
+                  <a:noFill/>
+                  <a:prstDash val="solid"/>
+                </a:ln>
+                <a:solidFill>
+                  <a:srgbClr val="FFFFFF"/>
+                </a:solidFill>
+                <a:effectLst>
+                  <a:outerShdw blurRad="50800" dist="38100" dir="2700000" algn="tl" rotWithShape="0">
+                    <a:prstClr val="black">
+                      <a:alpha val="40000"/>
+                    </a:prstClr>
+                  </a:outerShdw>
+                </a:effectLst>
+                <a:latin typeface="Times New Roman" pitchFamily="18" charset="0"/>
+                <a:cs typeface="Times New Roman" pitchFamily="18" charset="0"/>
+              </a:rPr>
+              <a:t> prívet</a:t>
+            </a:r>
+            <a:r>
+              <a:rPr lang="en-US" sz="2000" kern="0" dirty="0" err="1" smtClean="0">
+                <a:ln w="18415" cmpd="sng">
+                  <a:noFill/>
+                  <a:prstDash val="solid"/>
+                </a:ln>
+                <a:solidFill>
+                  <a:srgbClr val="FFFFFF"/>
+                </a:solidFill>
+                <a:effectLst>
+                  <a:outerShdw blurRad="50800" dist="38100" dir="2700000" algn="tl" rotWithShape="0">
+                    <a:prstClr val="black">
+                      <a:alpha val="40000"/>
+                    </a:prstClr>
+                  </a:outerShdw>
+                </a:effectLst>
+                <a:latin typeface="Times New Roman" pitchFamily="18" charset="0"/>
+                <a:cs typeface="Times New Roman" pitchFamily="18" charset="0"/>
+              </a:rPr>
+              <a:t>i</a:t>
+            </a:r>
+            <a:r>
+              <a:rPr lang="sk-SK" sz="2000" kern="0" dirty="0" err="1" smtClean="0">
+                <a:ln w="18415" cmpd="sng">
+                  <a:noFill/>
+                  <a:prstDash val="solid"/>
+                </a:ln>
+                <a:solidFill>
+                  <a:srgbClr val="FFFFFF"/>
+                </a:solidFill>
+                <a:effectLst>
+                  <a:outerShdw blurRad="50800" dist="38100" dir="2700000" algn="tl" rotWithShape="0">
+                    <a:prstClr val="black">
+                      <a:alpha val="40000"/>
+                    </a:prstClr>
+                  </a:outerShdw>
+                </a:effectLst>
+                <a:latin typeface="Times New Roman" pitchFamily="18" charset="0"/>
+                <a:cs typeface="Times New Roman" pitchFamily="18" charset="0"/>
+              </a:rPr>
+              <a:t>vé</a:t>
+            </a:r>
+            <a:r>
+              <a:rPr lang="sk-SK" sz="2000" kern="0" dirty="0" smtClean="0">
+                <a:ln w="18415" cmpd="sng">
+                  <a:noFill/>
+                  <a:prstDash val="solid"/>
+                </a:ln>
+                <a:solidFill>
+                  <a:srgbClr val="FFFFFF"/>
+                </a:solidFill>
+                <a:effectLst>
+                  <a:outerShdw blurRad="50800" dist="38100" dir="2700000" algn="tl" rotWithShape="0">
+                    <a:prstClr val="black">
+                      <a:alpha val="40000"/>
+                    </a:prstClr>
+                  </a:outerShdw>
+                </a:effectLst>
+                <a:latin typeface="Times New Roman" pitchFamily="18" charset="0"/>
+                <a:cs typeface="Times New Roman" pitchFamily="18" charset="0"/>
+              </a:rPr>
+              <a:t> </a:t>
+            </a:r>
+            <a:r>
+              <a:rPr lang="sk-SK" sz="2000" kern="0" dirty="0" smtClean="0">
+                <a:ln w="18415" cmpd="sng">
+                  <a:noFill/>
+                  <a:prstDash val="solid"/>
+                </a:ln>
+                <a:solidFill>
+                  <a:srgbClr val="FFFFFF"/>
+                </a:solidFill>
+                <a:effectLst>
+                  <a:outerShdw blurRad="50800" dist="38100" dir="2700000" algn="tl" rotWithShape="0">
+                    <a:prstClr val="black">
+                      <a:alpha val="40000"/>
+                    </a:prstClr>
+                  </a:outerShdw>
+                </a:effectLst>
+                <a:latin typeface="Times New Roman" pitchFamily="18" charset="0"/>
+                <a:cs typeface="Times New Roman" pitchFamily="18" charset="0"/>
+              </a:rPr>
+              <a:t>rozhranie, ktoré by </a:t>
+            </a:r>
+            <a:r>
+              <a:rPr lang="sk-SK" sz="2000" kern="0" dirty="0" smtClean="0">
+                <a:ln w="18415" cmpd="sng">
+                  <a:noFill/>
+                  <a:prstDash val="solid"/>
+                </a:ln>
+                <a:solidFill>
+                  <a:srgbClr val="FFFFFF"/>
+                </a:solidFill>
+                <a:effectLst>
+                  <a:outerShdw blurRad="50800" dist="38100" dir="2700000" algn="tl" rotWithShape="0">
+                    <a:prstClr val="black">
+                      <a:alpha val="40000"/>
+                    </a:prstClr>
+                  </a:outerShdw>
+                </a:effectLst>
+                <a:latin typeface="Times New Roman" pitchFamily="18" charset="0"/>
+                <a:cs typeface="Times New Roman" pitchFamily="18" charset="0"/>
+              </a:rPr>
+              <a:t>uľahčovalo </a:t>
+            </a:r>
+            <a:r>
+              <a:rPr lang="sk-SK" sz="2000" kern="0" dirty="0" smtClean="0">
+                <a:ln w="18415" cmpd="sng">
+                  <a:noFill/>
+                  <a:prstDash val="solid"/>
+                </a:ln>
+                <a:solidFill>
+                  <a:srgbClr val="FFFFFF"/>
+                </a:solidFill>
+                <a:effectLst>
+                  <a:outerShdw blurRad="50800" dist="38100" dir="2700000" algn="tl" rotWithShape="0">
+                    <a:prstClr val="black">
+                      <a:alpha val="40000"/>
+                    </a:prstClr>
+                  </a:outerShdw>
+                </a:effectLst>
+                <a:latin typeface="Times New Roman" pitchFamily="18" charset="0"/>
+                <a:cs typeface="Times New Roman" pitchFamily="18" charset="0"/>
+              </a:rPr>
+              <a:t>prácu s textom</a:t>
             </a:r>
           </a:p>
         </p:txBody>
@@ -14523,7 +15560,7 @@
               <a:defRPr/>
             </a:pPr>
             <a:r>
-              <a:rPr kumimoji="0" lang="sk-SK" sz="2000" u="none" strike="noStrike" kern="0" cap="none" normalizeH="0" baseline="0" noProof="0" smtClean="0">
+              <a:rPr kumimoji="0" lang="sk-SK" sz="2000" u="none" strike="noStrike" kern="0" cap="none" normalizeH="0" baseline="0" noProof="0" dirty="0" smtClean="0">
                 <a:ln w="18415" cmpd="sng">
                   <a:noFill/>
                   <a:prstDash val="solid"/>
@@ -14546,7 +15583,7 @@
               <a:t>Editor</a:t>
             </a:r>
             <a:r>
-              <a:rPr lang="sk-SK" sz="2000" kern="0" smtClean="0">
+              <a:rPr lang="sk-SK" sz="2000" kern="0" dirty="0" smtClean="0">
                 <a:ln w="18415" cmpd="sng">
                   <a:noFill/>
                   <a:prstDash val="solid"/>
@@ -14564,7 +15601,49 @@
                 <a:latin typeface="Times New Roman" pitchFamily="18" charset="0"/>
                 <a:cs typeface="Times New Roman" pitchFamily="18" charset="0"/>
               </a:rPr>
-              <a:t> je realizovaný ako multiplatformová desktopová aplikácia </a:t>
+              <a:t> je realizovaný ako multiplatformová </a:t>
+            </a:r>
+            <a:r>
+              <a:rPr lang="sk-SK" sz="2000" kern="0" dirty="0" err="1" smtClean="0">
+                <a:ln w="18415" cmpd="sng">
+                  <a:noFill/>
+                  <a:prstDash val="solid"/>
+                </a:ln>
+                <a:solidFill>
+                  <a:srgbClr val="FFFFFF"/>
+                </a:solidFill>
+                <a:effectLst>
+                  <a:outerShdw blurRad="50800" dist="38100" dir="2700000" algn="tl" rotWithShape="0">
+                    <a:prstClr val="black">
+                      <a:alpha val="40000"/>
+                    </a:prstClr>
+                  </a:outerShdw>
+                </a:effectLst>
+                <a:latin typeface="Times New Roman" pitchFamily="18" charset="0"/>
+                <a:cs typeface="Times New Roman" pitchFamily="18" charset="0"/>
+              </a:rPr>
+              <a:t>desktopová</a:t>
+            </a:r>
+            <a:r>
+              <a:rPr lang="sk-SK" sz="2000" kern="0" dirty="0" smtClean="0">
+                <a:ln w="18415" cmpd="sng">
+                  <a:noFill/>
+                  <a:prstDash val="solid"/>
+                </a:ln>
+                <a:solidFill>
+                  <a:srgbClr val="FFFFFF"/>
+                </a:solidFill>
+                <a:effectLst>
+                  <a:outerShdw blurRad="50800" dist="38100" dir="2700000" algn="tl" rotWithShape="0">
+                    <a:prstClr val="black">
+                      <a:alpha val="40000"/>
+                    </a:prstClr>
+                  </a:outerShdw>
+                </a:effectLst>
+                <a:latin typeface="Times New Roman" pitchFamily="18" charset="0"/>
+                <a:cs typeface="Times New Roman" pitchFamily="18" charset="0"/>
+              </a:rPr>
+              <a:t> aplikácia </a:t>
             </a:r>
           </a:p>
           <a:p>
@@ -14575,7 +15654,7 @@
               <a:defRPr/>
             </a:pPr>
             <a:r>
-              <a:rPr lang="sk-SK" sz="2000" kern="0" smtClean="0">
+              <a:rPr lang="sk-SK" sz="2000" kern="0" dirty="0" smtClean="0">
                 <a:ln w="18415" cmpd="sng">
                   <a:noFill/>
                   <a:prstDash val="solid"/>
@@ -14596,7 +15675,7 @@
               <a:t>V</a:t>
             </a:r>
             <a:r>
-              <a:rPr lang="en-US" sz="2000" kern="0" smtClean="0">
+              <a:rPr lang="en-US" sz="2000" kern="0" dirty="0" err="1" smtClean="0">
                 <a:ln w="18415" cmpd="sng">
                   <a:noFill/>
                   <a:prstDash val="solid"/>
@@ -14617,7 +15696,7 @@
               <a:t>ychádza</a:t>
             </a:r>
             <a:r>
-              <a:rPr lang="sk-SK" sz="2000" kern="0" smtClean="0">
+              <a:rPr lang="sk-SK" sz="2000" kern="0" dirty="0" err="1" smtClean="0">
                 <a:ln w="18415" cmpd="sng">
                   <a:noFill/>
                   <a:prstDash val="solid"/>
@@ -14638,7 +15717,7 @@
               <a:t>me</a:t>
             </a:r>
             <a:r>
-              <a:rPr lang="en-US" sz="2000" kern="0" smtClean="0">
+              <a:rPr lang="en-US" sz="2000" kern="0" dirty="0" smtClean="0">
                 <a:ln w="18415" cmpd="sng">
                   <a:noFill/>
                   <a:prstDash val="solid"/>
@@ -14656,10 +15735,115 @@
                 <a:latin typeface="Times New Roman" pitchFamily="18" charset="0"/>
                 <a:cs typeface="Times New Roman" pitchFamily="18" charset="0"/>
               </a:rPr>
-              <a:t> z už použitých technológi</a:t>
-            </a:r>
-            <a:r>
-              <a:rPr lang="sk-SK" sz="2000" kern="0" smtClean="0">
+              <a:t> z </a:t>
+            </a:r>
+            <a:r>
+              <a:rPr lang="en-US" sz="2000" kern="0" dirty="0" err="1" smtClean="0">
+                <a:ln w="18415" cmpd="sng">
+                  <a:noFill/>
+                  <a:prstDash val="solid"/>
+                </a:ln>
+                <a:solidFill>
+                  <a:srgbClr val="FFFFFF"/>
+                </a:solidFill>
+                <a:effectLst>
+                  <a:outerShdw blurRad="50800" dist="38100" dir="2700000" algn="tl" rotWithShape="0">
+                    <a:prstClr val="black">
+                      <a:alpha val="40000"/>
+                    </a:prstClr>
+                  </a:outerShdw>
+                </a:effectLst>
+                <a:latin typeface="Times New Roman" pitchFamily="18" charset="0"/>
+                <a:cs typeface="Times New Roman" pitchFamily="18" charset="0"/>
+              </a:rPr>
+              <a:t>už</a:t>
+            </a:r>
+            <a:r>
+              <a:rPr lang="en-US" sz="2000" kern="0" dirty="0" smtClean="0">
+                <a:ln w="18415" cmpd="sng">
+                  <a:noFill/>
+                  <a:prstDash val="solid"/>
+                </a:ln>
+                <a:solidFill>
+                  <a:srgbClr val="FFFFFF"/>
+                </a:solidFill>
+                <a:effectLst>
+                  <a:outerShdw blurRad="50800" dist="38100" dir="2700000" algn="tl" rotWithShape="0">
+                    <a:prstClr val="black">
+                      <a:alpha val="40000"/>
+                    </a:prstClr>
+                  </a:outerShdw>
+                </a:effectLst>
+                <a:latin typeface="Times New Roman" pitchFamily="18" charset="0"/>
+                <a:cs typeface="Times New Roman" pitchFamily="18" charset="0"/>
+              </a:rPr>
+              <a:t> </a:t>
+            </a:r>
+            <a:r>
+              <a:rPr lang="en-US" sz="2000" kern="0" dirty="0" err="1" smtClean="0">
+                <a:ln w="18415" cmpd="sng">
+                  <a:noFill/>
+                  <a:prstDash val="solid"/>
+                </a:ln>
+                <a:solidFill>
+                  <a:srgbClr val="FFFFFF"/>
+                </a:solidFill>
+                <a:effectLst>
+                  <a:outerShdw blurRad="50800" dist="38100" dir="2700000" algn="tl" rotWithShape="0">
+                    <a:prstClr val="black">
+                      <a:alpha val="40000"/>
+                    </a:prstClr>
+                  </a:outerShdw>
+                </a:effectLst>
+                <a:latin typeface="Times New Roman" pitchFamily="18" charset="0"/>
+                <a:cs typeface="Times New Roman" pitchFamily="18" charset="0"/>
+              </a:rPr>
+              <a:t>použitých</a:t>
+            </a:r>
+            <a:r>
+              <a:rPr lang="en-US" sz="2000" kern="0" dirty="0" smtClean="0">
+                <a:ln w="18415" cmpd="sng">
+                  <a:noFill/>
+                  <a:prstDash val="solid"/>
+                </a:ln>
+                <a:solidFill>
+                  <a:srgbClr val="FFFFFF"/>
+                </a:solidFill>
+                <a:effectLst>
+                  <a:outerShdw blurRad="50800" dist="38100" dir="2700000" algn="tl" rotWithShape="0">
+                    <a:prstClr val="black">
+                      <a:alpha val="40000"/>
+                    </a:prstClr>
+                  </a:outerShdw>
+                </a:effectLst>
+                <a:latin typeface="Times New Roman" pitchFamily="18" charset="0"/>
+                <a:cs typeface="Times New Roman" pitchFamily="18" charset="0"/>
+              </a:rPr>
+              <a:t> </a:t>
+            </a:r>
+            <a:r>
+              <a:rPr lang="en-US" sz="2000" kern="0" dirty="0" err="1" smtClean="0">
+                <a:ln w="18415" cmpd="sng">
+                  <a:noFill/>
+                  <a:prstDash val="solid"/>
+                </a:ln>
+                <a:solidFill>
+                  <a:srgbClr val="FFFFFF"/>
+                </a:solidFill>
+                <a:effectLst>
+                  <a:outerShdw blurRad="50800" dist="38100" dir="2700000" algn="tl" rotWithShape="0">
+                    <a:prstClr val="black">
+                      <a:alpha val="40000"/>
+                    </a:prstClr>
+                  </a:outerShdw>
+                </a:effectLst>
+                <a:latin typeface="Times New Roman" pitchFamily="18" charset="0"/>
+                <a:cs typeface="Times New Roman" pitchFamily="18" charset="0"/>
+              </a:rPr>
+              <a:t>technológi</a:t>
+            </a:r>
+            <a:r>
+              <a:rPr lang="sk-SK" sz="2000" kern="0" dirty="0" smtClean="0">
                 <a:ln w="18415" cmpd="sng">
                   <a:noFill/>
                   <a:prstDash val="solid"/>
@@ -14693,7 +15877,7 @@
               <a:defRPr/>
             </a:pPr>
             <a:r>
-              <a:rPr lang="sk-SK" sz="2000" kern="0" smtClean="0">
+              <a:rPr lang="sk-SK" sz="2000" kern="0" dirty="0" smtClean="0">
                 <a:ln w="18415" cmpd="sng">
                   <a:noFill/>
                   <a:prstDash val="solid"/>
@@ -14711,7 +15895,91 @@
                 <a:latin typeface="Times New Roman" pitchFamily="18" charset="0"/>
                 <a:cs typeface="Times New Roman" pitchFamily="18" charset="0"/>
               </a:rPr>
-              <a:t> Qt Creator 	vývojové prostredie</a:t>
+              <a:t> </a:t>
+            </a:r>
+            <a:r>
+              <a:rPr lang="sk-SK" sz="2000" kern="0" dirty="0" err="1" smtClean="0">
+                <a:ln w="18415" cmpd="sng">
+                  <a:noFill/>
+                  <a:prstDash val="solid"/>
+                </a:ln>
+                <a:solidFill>
+                  <a:srgbClr val="FFFFFF"/>
+                </a:solidFill>
+                <a:effectLst>
+                  <a:outerShdw blurRad="50800" dist="38100" dir="2700000" algn="tl" rotWithShape="0">
+                    <a:prstClr val="black">
+                      <a:alpha val="40000"/>
+                    </a:prstClr>
+                  </a:outerShdw>
+                </a:effectLst>
+                <a:latin typeface="Times New Roman" pitchFamily="18" charset="0"/>
+                <a:cs typeface="Times New Roman" pitchFamily="18" charset="0"/>
+              </a:rPr>
+              <a:t>Qt</a:t>
+            </a:r>
+            <a:r>
+              <a:rPr lang="sk-SK" sz="2000" kern="0" dirty="0" smtClean="0">
+                <a:ln w="18415" cmpd="sng">
+                  <a:noFill/>
+                  <a:prstDash val="solid"/>
+                </a:ln>
+                <a:solidFill>
+                  <a:srgbClr val="FFFFFF"/>
+                </a:solidFill>
+                <a:effectLst>
+                  <a:outerShdw blurRad="50800" dist="38100" dir="2700000" algn="tl" rotWithShape="0">
+                    <a:prstClr val="black">
+                      <a:alpha val="40000"/>
+                    </a:prstClr>
+                  </a:outerShdw>
+                </a:effectLst>
+                <a:latin typeface="Times New Roman" pitchFamily="18" charset="0"/>
+                <a:cs typeface="Times New Roman" pitchFamily="18" charset="0"/>
+              </a:rPr>
+              <a:t> </a:t>
+            </a:r>
+            <a:r>
+              <a:rPr lang="sk-SK" sz="2000" kern="0" dirty="0" err="1" smtClean="0">
+                <a:ln w="18415" cmpd="sng">
+                  <a:noFill/>
+                  <a:prstDash val="solid"/>
+                </a:ln>
+                <a:solidFill>
+                  <a:srgbClr val="FFFFFF"/>
+                </a:solidFill>
+                <a:effectLst>
+                  <a:outerShdw blurRad="50800" dist="38100" dir="2700000" algn="tl" rotWithShape="0">
+                    <a:prstClr val="black">
+                      <a:alpha val="40000"/>
+                    </a:prstClr>
+                  </a:outerShdw>
+                </a:effectLst>
+                <a:latin typeface="Times New Roman" pitchFamily="18" charset="0"/>
+                <a:cs typeface="Times New Roman" pitchFamily="18" charset="0"/>
+              </a:rPr>
+              <a:t>Creator</a:t>
+            </a:r>
+            <a:r>
+              <a:rPr lang="sk-SK" sz="2000" kern="0" dirty="0" smtClean="0">
+                <a:ln w="18415" cmpd="sng">
+                  <a:noFill/>
+                  <a:prstDash val="solid"/>
+                </a:ln>
+                <a:solidFill>
+                  <a:srgbClr val="FFFFFF"/>
+                </a:solidFill>
+                <a:effectLst>
+                  <a:outerShdw blurRad="50800" dist="38100" dir="2700000" algn="tl" rotWithShape="0">
+                    <a:prstClr val="black">
+                      <a:alpha val="40000"/>
+                    </a:prstClr>
+                  </a:outerShdw>
+                </a:effectLst>
+                <a:latin typeface="Times New Roman" pitchFamily="18" charset="0"/>
+                <a:cs typeface="Times New Roman" pitchFamily="18" charset="0"/>
+              </a:rPr>
+              <a:t> 	vývojové prostredie</a:t>
             </a:r>
           </a:p>
           <a:p>
@@ -14727,7 +15995,7 @@
               <a:defRPr/>
             </a:pPr>
             <a:r>
-              <a:rPr lang="sk-SK" sz="2000" kern="0" smtClean="0">
+              <a:rPr lang="sk-SK" sz="2000" kern="0" dirty="0" smtClean="0">
                 <a:ln w="18415" cmpd="sng">
                   <a:noFill/>
                   <a:prstDash val="solid"/>
@@ -14745,10 +16013,10 @@
                 <a:latin typeface="Times New Roman" pitchFamily="18" charset="0"/>
                 <a:cs typeface="Times New Roman" pitchFamily="18" charset="0"/>
               </a:rPr>
-              <a:t> Qt framework 	</a:t>
-            </a:r>
-            <a:r>
-              <a:rPr lang="pt-BR" sz="2000" kern="0" smtClean="0">
+              <a:t> </a:t>
+            </a:r>
+            <a:r>
+              <a:rPr lang="sk-SK" sz="2000" kern="0" dirty="0" err="1" smtClean="0">
                 <a:ln w="18415" cmpd="sng">
                   <a:noFill/>
                   <a:prstDash val="solid"/>
@@ -14766,9 +16034,93 @@
                 <a:latin typeface="Times New Roman" pitchFamily="18" charset="0"/>
                 <a:cs typeface="Times New Roman" pitchFamily="18" charset="0"/>
               </a:rPr>
+              <a:t>Qt</a:t>
+            </a:r>
+            <a:r>
+              <a:rPr lang="sk-SK" sz="2000" kern="0" dirty="0" smtClean="0">
+                <a:ln w="18415" cmpd="sng">
+                  <a:noFill/>
+                  <a:prstDash val="solid"/>
+                </a:ln>
+                <a:solidFill>
+                  <a:srgbClr val="FFFFFF"/>
+                </a:solidFill>
+                <a:effectLst>
+                  <a:outerShdw blurRad="50800" dist="38100" dir="2700000" algn="tl" rotWithShape="0">
+                    <a:prstClr val="black">
+                      <a:alpha val="40000"/>
+                    </a:prstClr>
+                  </a:outerShdw>
+                </a:effectLst>
+                <a:latin typeface="Times New Roman" pitchFamily="18" charset="0"/>
+                <a:cs typeface="Times New Roman" pitchFamily="18" charset="0"/>
+              </a:rPr>
+              <a:t> </a:t>
+            </a:r>
+            <a:r>
+              <a:rPr lang="sk-SK" sz="2000" kern="0" dirty="0" err="1" smtClean="0">
+                <a:ln w="18415" cmpd="sng">
+                  <a:noFill/>
+                  <a:prstDash val="solid"/>
+                </a:ln>
+                <a:solidFill>
+                  <a:srgbClr val="FFFFFF"/>
+                </a:solidFill>
+                <a:effectLst>
+                  <a:outerShdw blurRad="50800" dist="38100" dir="2700000" algn="tl" rotWithShape="0">
+                    <a:prstClr val="black">
+                      <a:alpha val="40000"/>
+                    </a:prstClr>
+                  </a:outerShdw>
+                </a:effectLst>
+                <a:latin typeface="Times New Roman" pitchFamily="18" charset="0"/>
+                <a:cs typeface="Times New Roman" pitchFamily="18" charset="0"/>
+              </a:rPr>
+              <a:t>framework</a:t>
+            </a:r>
+            <a:r>
+              <a:rPr lang="sk-SK" sz="2000" kern="0" dirty="0" smtClean="0">
+                <a:ln w="18415" cmpd="sng">
+                  <a:noFill/>
+                  <a:prstDash val="solid"/>
+                </a:ln>
+                <a:solidFill>
+                  <a:srgbClr val="FFFFFF"/>
+                </a:solidFill>
+                <a:effectLst>
+                  <a:outerShdw blurRad="50800" dist="38100" dir="2700000" algn="tl" rotWithShape="0">
+                    <a:prstClr val="black">
+                      <a:alpha val="40000"/>
+                    </a:prstClr>
+                  </a:outerShdw>
+                </a:effectLst>
+                <a:latin typeface="Times New Roman" pitchFamily="18" charset="0"/>
+                <a:cs typeface="Times New Roman" pitchFamily="18" charset="0"/>
+              </a:rPr>
+              <a:t> 	</a:t>
+            </a:r>
+            <a:r>
+              <a:rPr lang="pt-BR" sz="2000" kern="0" dirty="0" smtClean="0">
+                <a:ln w="18415" cmpd="sng">
+                  <a:noFill/>
+                  <a:prstDash val="solid"/>
+                </a:ln>
+                <a:solidFill>
+                  <a:srgbClr val="FFFFFF"/>
+                </a:solidFill>
+                <a:effectLst>
+                  <a:outerShdw blurRad="50800" dist="38100" dir="2700000" algn="tl" rotWithShape="0">
+                    <a:prstClr val="black">
+                      <a:alpha val="40000"/>
+                    </a:prstClr>
+                  </a:outerShdw>
+                </a:effectLst>
+                <a:latin typeface="Times New Roman" pitchFamily="18" charset="0"/>
+                <a:cs typeface="Times New Roman" pitchFamily="18" charset="0"/>
+              </a:rPr>
               <a:t>široké možnosti práce s grafikou</a:t>
             </a:r>
-            <a:endParaRPr lang="sk-SK" sz="2000" kern="0" smtClean="0">
+            <a:endParaRPr lang="sk-SK" sz="2000" kern="0" dirty="0" smtClean="0">
               <a:ln w="18415" cmpd="sng">
                 <a:noFill/>
                 <a:prstDash val="solid"/>
@@ -14800,7 +16152,7 @@
               <a:defRPr/>
             </a:pPr>
             <a:r>
-              <a:rPr lang="pl-PL" sz="2000" kern="0" smtClean="0">
+              <a:rPr lang="pl-PL" sz="2000" kern="0" dirty="0" smtClean="0">
                 <a:ln w="18415" cmpd="sng">
                   <a:noFill/>
                   <a:prstDash val="solid"/>
@@ -14820,7 +16172,7 @@
               </a:rPr>
               <a:t>C++ 	programovací jazyk editora</a:t>
             </a:r>
-            <a:endParaRPr lang="sk-SK" sz="2000" kern="0" smtClean="0">
+            <a:endParaRPr lang="sk-SK" sz="2000" kern="0" dirty="0" smtClean="0">
               <a:ln w="18415" cmpd="sng">
                 <a:noFill/>
                 <a:prstDash val="solid"/>
@@ -14852,7 +16204,7 @@
               <a:defRPr/>
             </a:pPr>
             <a:r>
-              <a:rPr lang="sk-SK" sz="2000" kern="0" smtClean="0">
+              <a:rPr lang="sk-SK" sz="2000" kern="0" dirty="0" smtClean="0">
                 <a:ln w="18415" cmpd="sng">
                   <a:noFill/>
                   <a:prstDash val="solid"/>
@@ -14870,8 +16222,152 @@
                 <a:latin typeface="Times New Roman" pitchFamily="18" charset="0"/>
                 <a:cs typeface="Times New Roman" pitchFamily="18" charset="0"/>
               </a:rPr>
-              <a:t> Lua (LuaJit) 	realizuje veľkú časť vypočtou </a:t>
-            </a:r>
+              <a:t> </a:t>
+            </a:r>
+            <a:r>
+              <a:rPr lang="sk-SK" sz="2000" kern="0" dirty="0" err="1" smtClean="0">
+                <a:ln w="18415" cmpd="sng">
+                  <a:noFill/>
+                  <a:prstDash val="solid"/>
+                </a:ln>
+                <a:solidFill>
+                  <a:srgbClr val="FFFFFF"/>
+                </a:solidFill>
+                <a:effectLst>
+                  <a:outerShdw blurRad="50800" dist="38100" dir="2700000" algn="tl" rotWithShape="0">
+                    <a:prstClr val="black">
+                      <a:alpha val="40000"/>
+                    </a:prstClr>
+                  </a:outerShdw>
+                </a:effectLst>
+                <a:latin typeface="Times New Roman" pitchFamily="18" charset="0"/>
+                <a:cs typeface="Times New Roman" pitchFamily="18" charset="0"/>
+              </a:rPr>
+              <a:t>Lua</a:t>
+            </a:r>
+            <a:r>
+              <a:rPr lang="sk-SK" sz="2000" kern="0" dirty="0" smtClean="0">
+                <a:ln w="18415" cmpd="sng">
+                  <a:noFill/>
+                  <a:prstDash val="solid"/>
+                </a:ln>
+                <a:solidFill>
+                  <a:srgbClr val="FFFFFF"/>
+                </a:solidFill>
+                <a:effectLst>
+                  <a:outerShdw blurRad="50800" dist="38100" dir="2700000" algn="tl" rotWithShape="0">
+                    <a:prstClr val="black">
+                      <a:alpha val="40000"/>
+                    </a:prstClr>
+                  </a:outerShdw>
+                </a:effectLst>
+                <a:latin typeface="Times New Roman" pitchFamily="18" charset="0"/>
+                <a:cs typeface="Times New Roman" pitchFamily="18" charset="0"/>
+              </a:rPr>
+              <a:t> (</a:t>
+            </a:r>
+            <a:r>
+              <a:rPr lang="sk-SK" sz="2000" kern="0" dirty="0" err="1" smtClean="0">
+                <a:ln w="18415" cmpd="sng">
+                  <a:noFill/>
+                  <a:prstDash val="solid"/>
+                </a:ln>
+                <a:solidFill>
+                  <a:srgbClr val="FFFFFF"/>
+                </a:solidFill>
+                <a:effectLst>
+                  <a:outerShdw blurRad="50800" dist="38100" dir="2700000" algn="tl" rotWithShape="0">
+                    <a:prstClr val="black">
+                      <a:alpha val="40000"/>
+                    </a:prstClr>
+                  </a:outerShdw>
+                </a:effectLst>
+                <a:latin typeface="Times New Roman" pitchFamily="18" charset="0"/>
+                <a:cs typeface="Times New Roman" pitchFamily="18" charset="0"/>
+              </a:rPr>
+              <a:t>LuaJit</a:t>
+            </a:r>
+            <a:r>
+              <a:rPr lang="sk-SK" sz="2000" kern="0" dirty="0" smtClean="0">
+                <a:ln w="18415" cmpd="sng">
+                  <a:noFill/>
+                  <a:prstDash val="solid"/>
+                </a:ln>
+                <a:solidFill>
+                  <a:srgbClr val="FFFFFF"/>
+                </a:solidFill>
+                <a:effectLst>
+                  <a:outerShdw blurRad="50800" dist="38100" dir="2700000" algn="tl" rotWithShape="0">
+                    <a:prstClr val="black">
+                      <a:alpha val="40000"/>
+                    </a:prstClr>
+                  </a:outerShdw>
+                </a:effectLst>
+                <a:latin typeface="Times New Roman" pitchFamily="18" charset="0"/>
+                <a:cs typeface="Times New Roman" pitchFamily="18" charset="0"/>
+              </a:rPr>
+              <a:t>) 	realizuje veľkú časť </a:t>
+            </a:r>
+            <a:r>
+              <a:rPr lang="sk-SK" sz="2000" kern="0" dirty="0" err="1" smtClean="0">
+                <a:ln w="18415" cmpd="sng">
+                  <a:noFill/>
+                  <a:prstDash val="solid"/>
+                </a:ln>
+                <a:solidFill>
+                  <a:srgbClr val="FFFFFF"/>
+                </a:solidFill>
+                <a:effectLst>
+                  <a:outerShdw blurRad="50800" dist="38100" dir="2700000" algn="tl" rotWithShape="0">
+                    <a:prstClr val="black">
+                      <a:alpha val="40000"/>
+                    </a:prstClr>
+                  </a:outerShdw>
+                </a:effectLst>
+                <a:latin typeface="Times New Roman" pitchFamily="18" charset="0"/>
+                <a:cs typeface="Times New Roman" pitchFamily="18" charset="0"/>
+              </a:rPr>
+              <a:t>vypočtu</a:t>
+            </a:r>
+            <a:r>
+              <a:rPr lang="sk-SK" sz="2000" kern="0" dirty="0" smtClean="0">
+                <a:ln w="18415" cmpd="sng">
+                  <a:noFill/>
+                  <a:prstDash val="solid"/>
+                </a:ln>
+                <a:solidFill>
+                  <a:srgbClr val="FFFFFF"/>
+                </a:solidFill>
+                <a:effectLst>
+                  <a:outerShdw blurRad="50800" dist="38100" dir="2700000" algn="tl" rotWithShape="0">
+                    <a:prstClr val="black">
+                      <a:alpha val="40000"/>
+                    </a:prstClr>
+                  </a:outerShdw>
+                </a:effectLst>
+                <a:latin typeface="Times New Roman" pitchFamily="18" charset="0"/>
+                <a:cs typeface="Times New Roman" pitchFamily="18" charset="0"/>
+              </a:rPr>
+              <a:t> </a:t>
+            </a:r>
+            <a:endParaRPr lang="sk-SK" sz="2000" kern="0" dirty="0" smtClean="0">
+              <a:ln w="18415" cmpd="sng">
+                <a:noFill/>
+                <a:prstDash val="solid"/>
+              </a:ln>
+              <a:solidFill>
+                <a:srgbClr val="FFFFFF"/>
+              </a:solidFill>
+              <a:effectLst>
+                <a:outerShdw blurRad="50800" dist="38100" dir="2700000" algn="tl" rotWithShape="0">
+                  <a:prstClr val="black">
+                    <a:alpha val="40000"/>
+                  </a:prstClr>
+                </a:outerShdw>
+              </a:effectLst>
+              <a:latin typeface="Times New Roman" pitchFamily="18" charset="0"/>
+              <a:cs typeface="Times New Roman" pitchFamily="18" charset="0"/>
+            </a:endParaRPr>
           </a:p>
           <a:p>
             <a:pPr lvl="1">
@@ -14886,7 +16382,7 @@
               <a:defRPr/>
             </a:pPr>
             <a:r>
-              <a:rPr kumimoji="0" lang="sk-SK" sz="2000" u="none" strike="noStrike" kern="0" cap="none" normalizeH="0" baseline="0" noProof="0" smtClean="0">
+              <a:rPr kumimoji="0" lang="sk-SK" sz="2000" u="none" strike="noStrike" kern="0" cap="none" normalizeH="0" baseline="0" noProof="0" dirty="0" smtClean="0">
                 <a:ln w="18415" cmpd="sng">
                   <a:noFill/>
                   <a:prstDash val="solid"/>
@@ -14906,7 +16402,53 @@
                 <a:latin typeface="Times New Roman" pitchFamily="18" charset="0"/>
                 <a:cs typeface="Times New Roman" pitchFamily="18" charset="0"/>
               </a:rPr>
-              <a:t>Knižnica Lpeg 	syntaktická analýza textu</a:t>
+              <a:t>Knižnica </a:t>
+            </a:r>
+            <a:r>
+              <a:rPr kumimoji="0" lang="sk-SK" sz="2000" u="none" strike="noStrike" kern="0" cap="none" normalizeH="0" baseline="0" noProof="0" dirty="0" err="1" smtClean="0">
+                <a:ln w="18415" cmpd="sng">
+                  <a:noFill/>
+                  <a:prstDash val="solid"/>
+                </a:ln>
+                <a:solidFill>
+                  <a:srgbClr val="FFFFFF"/>
+                </a:solidFill>
+                <a:effectLst>
+                  <a:outerShdw blurRad="50800" dist="38100" dir="2700000" algn="tl" rotWithShape="0">
+                    <a:prstClr val="black">
+                      <a:alpha val="40000"/>
+                    </a:prstClr>
+                  </a:outerShdw>
+                </a:effectLst>
+                <a:uLnTx/>
+                <a:uFillTx/>
+                <a:latin typeface="Times New Roman" pitchFamily="18" charset="0"/>
+                <a:cs typeface="Times New Roman" pitchFamily="18" charset="0"/>
+              </a:rPr>
+              <a:t>Lpeg</a:t>
+            </a:r>
+            <a:r>
+              <a:rPr kumimoji="0" lang="sk-SK" sz="2000" u="none" strike="noStrike" kern="0" cap="none" normalizeH="0" baseline="0" noProof="0" dirty="0" smtClean="0">
+                <a:ln w="18415" cmpd="sng">
+                  <a:noFill/>
+                  <a:prstDash val="solid"/>
+                </a:ln>
+                <a:solidFill>
+                  <a:srgbClr val="FFFFFF"/>
+                </a:solidFill>
+                <a:effectLst>
+                  <a:outerShdw blurRad="50800" dist="38100" dir="2700000" algn="tl" rotWithShape="0">
+                    <a:prstClr val="black">
+                      <a:alpha val="40000"/>
+                    </a:prstClr>
+                  </a:outerShdw>
+                </a:effectLst>
+                <a:uLnTx/>
+                <a:uFillTx/>
+                <a:latin typeface="Times New Roman" pitchFamily="18" charset="0"/>
+                <a:cs typeface="Times New Roman" pitchFamily="18" charset="0"/>
+              </a:rPr>
+              <a:t> 	syntaktická analýza textu</a:t>
             </a:r>
           </a:p>
         </p:txBody>
@@ -15644,7 +17186,7 @@
               <a:defRPr/>
             </a:pPr>
             <a:r>
-              <a:rPr lang="sk-SK" sz="2000" kern="0" smtClean="0">
+              <a:rPr lang="sk-SK" sz="2000" kern="0" dirty="0" smtClean="0">
                 <a:ln w="18415" cmpd="sng">
                   <a:noFill/>
                   <a:prstDash val="solid"/>
@@ -15662,89 +17204,8 @@
                 <a:latin typeface="Times New Roman" pitchFamily="18" charset="0"/>
                 <a:cs typeface="Times New Roman" pitchFamily="18" charset="0"/>
               </a:rPr>
-              <a:t> Rozpracovaný </a:t>
-            </a:r>
-            <a:r>
-              <a:rPr lang="sk-SK" sz="2000" kern="0" smtClean="0">
-                <a:ln w="18415" cmpd="sng">
-                  <a:noFill/>
-                  <a:prstDash val="solid"/>
-                </a:ln>
-                <a:solidFill>
-                  <a:srgbClr val="FFFFFF"/>
-                </a:solidFill>
-                <a:effectLst>
-                  <a:outerShdw blurRad="50800" dist="38100" dir="2700000" algn="tl" rotWithShape="0">
-                    <a:prstClr val="black">
-                      <a:alpha val="40000"/>
-                    </a:prstClr>
-                  </a:outerShdw>
-                </a:effectLst>
-                <a:latin typeface="Times New Roman" pitchFamily="18" charset="0"/>
-                <a:cs typeface="Times New Roman" pitchFamily="18" charset="0"/>
-              </a:rPr>
-              <a:t>projekt po </a:t>
-            </a:r>
-            <a:r>
-              <a:rPr lang="sk-SK" sz="2000" kern="0" smtClean="0">
-                <a:ln w="18415" cmpd="sng">
-                  <a:noFill/>
-                  <a:prstDash val="solid"/>
-                </a:ln>
-                <a:solidFill>
-                  <a:srgbClr val="FFFFFF"/>
-                </a:solidFill>
-                <a:effectLst>
-                  <a:outerShdw blurRad="50800" dist="38100" dir="2700000" algn="tl" rotWithShape="0">
-                    <a:prstClr val="black">
-                      <a:alpha val="40000"/>
-                    </a:prstClr>
-                  </a:outerShdw>
-                </a:effectLst>
-                <a:latin typeface="Times New Roman" pitchFamily="18" charset="0"/>
-                <a:cs typeface="Times New Roman" pitchFamily="18" charset="0"/>
-              </a:rPr>
-              <a:t>minulom </a:t>
-            </a:r>
-            <a:r>
-              <a:rPr lang="sk-SK" sz="2000" kern="0" smtClean="0">
-                <a:ln w="18415" cmpd="sng">
-                  <a:noFill/>
-                  <a:prstDash val="solid"/>
-                </a:ln>
-                <a:solidFill>
-                  <a:srgbClr val="FFFFFF"/>
-                </a:solidFill>
-                <a:effectLst>
-                  <a:outerShdw blurRad="50800" dist="38100" dir="2700000" algn="tl" rotWithShape="0">
-                    <a:prstClr val="black">
-                      <a:alpha val="40000"/>
-                    </a:prstClr>
-                  </a:outerShdw>
-                </a:effectLst>
-                <a:latin typeface="Times New Roman" pitchFamily="18" charset="0"/>
-                <a:cs typeface="Times New Roman" pitchFamily="18" charset="0"/>
-              </a:rPr>
-              <a:t>tíme UFOPAK</a:t>
-            </a:r>
-            <a:endParaRPr lang="sk-SK" sz="2000" kern="0" smtClean="0">
-              <a:ln w="18415" cmpd="sng">
-                <a:noFill/>
-                <a:prstDash val="solid"/>
-              </a:ln>
-              <a:solidFill>
-                <a:srgbClr val="FFFFFF"/>
-              </a:solidFill>
-              <a:effectLst>
-                <a:outerShdw blurRad="50800" dist="38100" dir="2700000" algn="tl" rotWithShape="0">
-                  <a:prstClr val="black">
-                    <a:alpha val="40000"/>
-                  </a:prstClr>
-                </a:outerShdw>
-              </a:effectLst>
-              <a:latin typeface="Times New Roman" pitchFamily="18" charset="0"/>
-              <a:cs typeface="Times New Roman" pitchFamily="18" charset="0"/>
-            </a:endParaRPr>
+              <a:t> Rozpracovaný projekt po minulom tíme UFOPAK</a:t>
+            </a:r>
           </a:p>
           <a:p>
             <a:pPr>
@@ -15756,7 +17217,7 @@
               <a:defRPr/>
             </a:pPr>
             <a:r>
-              <a:rPr lang="sk-SK" sz="2000" kern="0" smtClean="0">
+              <a:rPr lang="sk-SK" sz="2000" kern="0" dirty="0" smtClean="0">
                 <a:ln w="18415" cmpd="sng">
                   <a:noFill/>
                   <a:prstDash val="solid"/>
@@ -15787,7 +17248,7 @@
               <a:defRPr/>
             </a:pPr>
             <a:r>
-              <a:rPr lang="sk-SK" sz="2000" kern="0" smtClean="0">
+              <a:rPr lang="sk-SK" sz="2000" kern="0" dirty="0" smtClean="0">
                 <a:ln w="18415" cmpd="sng">
                   <a:noFill/>
                   <a:prstDash val="solid"/>
@@ -15818,7 +17279,7 @@
               <a:defRPr/>
             </a:pPr>
             <a:r>
-              <a:rPr lang="sk-SK" sz="2000" kern="0" smtClean="0">
+              <a:rPr lang="sk-SK" sz="2000" kern="0" dirty="0" smtClean="0">
                 <a:ln w="18415" cmpd="sng">
                   <a:noFill/>
                   <a:prstDash val="solid"/>
@@ -15836,30 +17297,9 @@
                 <a:latin typeface="Times New Roman" pitchFamily="18" charset="0"/>
                 <a:cs typeface="Times New Roman" pitchFamily="18" charset="0"/>
               </a:rPr>
-              <a:t> Pokročilé zobrazovanie komentárov, písanie komentáru rovno ku </a:t>
-            </a:r>
-            <a:r>
-              <a:rPr lang="sk-SK" sz="2000" kern="0" smtClean="0">
-                <a:ln w="18415" cmpd="sng">
-                  <a:noFill/>
-                  <a:prstDash val="solid"/>
-                </a:ln>
-                <a:solidFill>
-                  <a:srgbClr val="FFFFFF"/>
-                </a:solidFill>
-                <a:effectLst>
-                  <a:outerShdw blurRad="50800" dist="38100" dir="2700000" algn="tl" rotWithShape="0">
-                    <a:prstClr val="black">
-                      <a:alpha val="40000"/>
-                    </a:prstClr>
-                  </a:outerShdw>
-                </a:effectLst>
-                <a:latin typeface="Times New Roman" pitchFamily="18" charset="0"/>
-                <a:cs typeface="Times New Roman" pitchFamily="18" charset="0"/>
-              </a:rPr>
-              <a:t>kódu</a:t>
-            </a:r>
-            <a:endParaRPr lang="pl-PL" sz="2000" kern="0" smtClean="0">
+              <a:t> Pokročilé zobrazovanie komentárov, písanie komentáru rovno ku kódu</a:t>
+            </a:r>
+            <a:endParaRPr lang="pl-PL" sz="2000" kern="0" dirty="0" smtClean="0">
               <a:ln w="18415" cmpd="sng">
                 <a:noFill/>
                 <a:prstDash val="solid"/>
@@ -16591,7 +18031,7 @@
         <p:spPr>
           <a:xfrm>
             <a:off x="428596" y="1000112"/>
-            <a:ext cx="8286808" cy="3836195"/>
+            <a:ext cx="8286808" cy="4308872"/>
           </a:xfrm>
           <a:prstGeom prst="rect">
             <a:avLst/>
@@ -16613,7 +18053,7 @@
               <a:defRPr/>
             </a:pPr>
             <a:r>
-              <a:rPr lang="sk-SK" sz="2000" kern="0" smtClean="0">
+              <a:rPr lang="sk-SK" sz="2000" kern="0" dirty="0" smtClean="0">
                 <a:ln w="18415" cmpd="sng">
                   <a:noFill/>
                   <a:prstDash val="solid"/>
@@ -16634,7 +18074,7 @@
               <a:t> </a:t>
             </a:r>
             <a:r>
-              <a:rPr lang="sk-SK" sz="2000" kern="0" smtClean="0">
+              <a:rPr lang="sk-SK" sz="2000" kern="0" dirty="0" smtClean="0">
                 <a:ln w="18415" cmpd="sng">
                   <a:noFill/>
                   <a:prstDash val="solid"/>
@@ -16652,8 +18092,26 @@
                 <a:latin typeface="Times New Roman" pitchFamily="18" charset="0"/>
                 <a:cs typeface="Times New Roman" pitchFamily="18" charset="0"/>
               </a:rPr>
-              <a:t>Analyzovaný stav editora – čo bolo implementované a čo chýba</a:t>
-            </a:r>
+              <a:t>Vizualizácia zdrojového kódu je neefektívna</a:t>
+            </a:r>
+            <a:endParaRPr lang="sk-SK" sz="2000" kern="0" dirty="0" smtClean="0">
+              <a:ln w="18415" cmpd="sng">
+                <a:noFill/>
+                <a:prstDash val="solid"/>
+              </a:ln>
+              <a:solidFill>
+                <a:srgbClr val="FFFFFF"/>
+              </a:solidFill>
+              <a:effectLst>
+                <a:outerShdw blurRad="50800" dist="38100" dir="2700000" algn="tl" rotWithShape="0">
+                  <a:prstClr val="black">
+                    <a:alpha val="40000"/>
+                  </a:prstClr>
+                </a:outerShdw>
+              </a:effectLst>
+              <a:latin typeface="Times New Roman" pitchFamily="18" charset="0"/>
+              <a:cs typeface="Times New Roman" pitchFamily="18" charset="0"/>
+            </a:endParaRPr>
           </a:p>
           <a:p>
             <a:pPr>
@@ -16665,7 +18123,7 @@
               <a:defRPr/>
             </a:pPr>
             <a:r>
-              <a:rPr lang="sk-SK" sz="2000" kern="0" smtClean="0">
+              <a:rPr lang="sk-SK" sz="2000" kern="0" dirty="0" smtClean="0">
                 <a:ln w="18415" cmpd="sng">
                   <a:noFill/>
                   <a:prstDash val="solid"/>
@@ -16686,7 +18144,7 @@
               <a:t> </a:t>
             </a:r>
             <a:r>
-              <a:rPr lang="sk-SK" sz="2000" kern="0" smtClean="0">
+              <a:rPr lang="sk-SK" sz="2000" kern="0" dirty="0" smtClean="0">
                 <a:ln w="18415" cmpd="sng">
                   <a:noFill/>
                   <a:prstDash val="solid"/>
@@ -16704,8 +18162,89 @@
                 <a:latin typeface="Times New Roman" pitchFamily="18" charset="0"/>
                 <a:cs typeface="Times New Roman" pitchFamily="18" charset="0"/>
               </a:rPr>
-              <a:t>Analýza zdrojových kódov</a:t>
-            </a:r>
+              <a:t>Podpora jazykov: C, </a:t>
+            </a:r>
+            <a:r>
+              <a:rPr lang="sk-SK" sz="2000" kern="0" dirty="0" err="1" smtClean="0">
+                <a:ln w="18415" cmpd="sng">
+                  <a:noFill/>
+                  <a:prstDash val="solid"/>
+                </a:ln>
+                <a:solidFill>
+                  <a:srgbClr val="FFFFFF"/>
+                </a:solidFill>
+                <a:effectLst>
+                  <a:outerShdw blurRad="50800" dist="38100" dir="2700000" algn="tl" rotWithShape="0">
+                    <a:prstClr val="black">
+                      <a:alpha val="40000"/>
+                    </a:prstClr>
+                  </a:outerShdw>
+                </a:effectLst>
+                <a:latin typeface="Times New Roman" pitchFamily="18" charset="0"/>
+                <a:cs typeface="Times New Roman" pitchFamily="18" charset="0"/>
+              </a:rPr>
+              <a:t>Lua</a:t>
+            </a:r>
+            <a:r>
+              <a:rPr lang="sk-SK" sz="2000" kern="0" dirty="0" smtClean="0">
+                <a:ln w="18415" cmpd="sng">
+                  <a:noFill/>
+                  <a:prstDash val="solid"/>
+                </a:ln>
+                <a:solidFill>
+                  <a:srgbClr val="FFFFFF"/>
+                </a:solidFill>
+                <a:effectLst>
+                  <a:outerShdw blurRad="50800" dist="38100" dir="2700000" algn="tl" rotWithShape="0">
+                    <a:prstClr val="black">
+                      <a:alpha val="40000"/>
+                    </a:prstClr>
+                  </a:outerShdw>
+                </a:effectLst>
+                <a:latin typeface="Times New Roman" pitchFamily="18" charset="0"/>
+                <a:cs typeface="Times New Roman" pitchFamily="18" charset="0"/>
+              </a:rPr>
+              <a:t>, </a:t>
+            </a:r>
+            <a:r>
+              <a:rPr lang="sk-SK" sz="2000" kern="0" dirty="0" err="1" smtClean="0">
+                <a:ln w="18415" cmpd="sng">
+                  <a:noFill/>
+                  <a:prstDash val="solid"/>
+                </a:ln>
+                <a:solidFill>
+                  <a:srgbClr val="FFFFFF"/>
+                </a:solidFill>
+                <a:effectLst>
+                  <a:outerShdw blurRad="50800" dist="38100" dir="2700000" algn="tl" rotWithShape="0">
+                    <a:prstClr val="black">
+                      <a:alpha val="40000"/>
+                    </a:prstClr>
+                  </a:outerShdw>
+                </a:effectLst>
+                <a:latin typeface="Times New Roman" pitchFamily="18" charset="0"/>
+                <a:cs typeface="Times New Roman" pitchFamily="18" charset="0"/>
+              </a:rPr>
+              <a:t>Xml</a:t>
+            </a:r>
+            <a:endParaRPr lang="sk-SK" sz="2000" kern="0" dirty="0" smtClean="0">
+              <a:ln w="18415" cmpd="sng">
+                <a:noFill/>
+                <a:prstDash val="solid"/>
+              </a:ln>
+              <a:solidFill>
+                <a:srgbClr val="FFFFFF"/>
+              </a:solidFill>
+              <a:effectLst>
+                <a:outerShdw blurRad="50800" dist="38100" dir="2700000" algn="tl" rotWithShape="0">
+                  <a:prstClr val="black">
+                    <a:alpha val="40000"/>
+                  </a:prstClr>
+                </a:outerShdw>
+              </a:effectLst>
+              <a:latin typeface="Times New Roman" pitchFamily="18" charset="0"/>
+              <a:cs typeface="Times New Roman" pitchFamily="18" charset="0"/>
+            </a:endParaRPr>
           </a:p>
           <a:p>
             <a:pPr>
@@ -16717,7 +18256,7 @@
               <a:defRPr/>
             </a:pPr>
             <a:r>
-              <a:rPr lang="sk-SK" sz="2000" kern="0" smtClean="0">
+              <a:rPr lang="sk-SK" sz="2000" kern="0" dirty="0" smtClean="0">
                 <a:ln w="18415" cmpd="sng">
                   <a:noFill/>
                   <a:prstDash val="solid"/>
@@ -16738,7 +18277,7 @@
               <a:t> </a:t>
             </a:r>
             <a:r>
-              <a:rPr lang="sk-SK" sz="2000" kern="0" smtClean="0">
+              <a:rPr lang="sk-SK" sz="2000" kern="0" dirty="0" smtClean="0">
                 <a:ln w="18415" cmpd="sng">
                   <a:noFill/>
                   <a:prstDash val="solid"/>
@@ -16756,8 +18295,47 @@
                 <a:latin typeface="Times New Roman" pitchFamily="18" charset="0"/>
                 <a:cs typeface="Times New Roman" pitchFamily="18" charset="0"/>
               </a:rPr>
-              <a:t>Analyzovanie riešení paralelizmu poskytované </a:t>
-            </a:r>
+              <a:t>Analýza zdrojového kódu a samotná práca s editorom sa vykonáva v rámci jedného </a:t>
+            </a:r>
+            <a:r>
+              <a:rPr lang="sk-SK" sz="2000" kern="0" dirty="0" err="1" smtClean="0">
+                <a:ln w="18415" cmpd="sng">
+                  <a:noFill/>
+                  <a:prstDash val="solid"/>
+                </a:ln>
+                <a:solidFill>
+                  <a:srgbClr val="FFFFFF"/>
+                </a:solidFill>
+                <a:effectLst>
+                  <a:outerShdw blurRad="50800" dist="38100" dir="2700000" algn="tl" rotWithShape="0">
+                    <a:prstClr val="black">
+                      <a:alpha val="40000"/>
+                    </a:prstClr>
+                  </a:outerShdw>
+                </a:effectLst>
+                <a:latin typeface="Times New Roman" pitchFamily="18" charset="0"/>
+                <a:cs typeface="Times New Roman" pitchFamily="18" charset="0"/>
+              </a:rPr>
+              <a:t>threadu</a:t>
+            </a:r>
+            <a:endParaRPr lang="sk-SK" sz="2000" kern="0" dirty="0" smtClean="0">
+              <a:ln w="18415" cmpd="sng">
+                <a:noFill/>
+                <a:prstDash val="solid"/>
+              </a:ln>
+              <a:solidFill>
+                <a:srgbClr val="FFFFFF"/>
+              </a:solidFill>
+              <a:effectLst>
+                <a:outerShdw blurRad="50800" dist="38100" dir="2700000" algn="tl" rotWithShape="0">
+                  <a:prstClr val="black">
+                    <a:alpha val="40000"/>
+                  </a:prstClr>
+                </a:outerShdw>
+              </a:effectLst>
+              <a:latin typeface="Times New Roman" pitchFamily="18" charset="0"/>
+              <a:cs typeface="Times New Roman" pitchFamily="18" charset="0"/>
+            </a:endParaRPr>
           </a:p>
           <a:p>
             <a:pPr>
@@ -16769,7 +18347,7 @@
               <a:defRPr/>
             </a:pPr>
             <a:r>
-              <a:rPr lang="sk-SK" sz="2000" kern="0" smtClean="0">
+              <a:rPr lang="sk-SK" sz="2000" kern="0" dirty="0" smtClean="0">
                 <a:ln w="18415" cmpd="sng">
                   <a:noFill/>
                   <a:prstDash val="solid"/>
@@ -16790,7 +18368,7 @@
               <a:t> </a:t>
             </a:r>
             <a:r>
-              <a:rPr lang="sk-SK" sz="2000" kern="0" smtClean="0">
+              <a:rPr lang="sk-SK" sz="2000" kern="0" dirty="0" smtClean="0">
                 <a:ln w="18415" cmpd="sng">
                   <a:noFill/>
                   <a:prstDash val="solid"/>
@@ -16808,8 +18386,26 @@
                 <a:latin typeface="Times New Roman" pitchFamily="18" charset="0"/>
                 <a:cs typeface="Times New Roman" pitchFamily="18" charset="0"/>
               </a:rPr>
-              <a:t>QML a CSS štýly pre efektívne vytvorenie používateľského prostredia</a:t>
-            </a:r>
+              <a:t>Jednoduché a nezaujímavé používateľské rozhranie</a:t>
+            </a:r>
+            <a:endParaRPr lang="sk-SK" sz="2000" kern="0" dirty="0" smtClean="0">
+              <a:ln w="18415" cmpd="sng">
+                <a:noFill/>
+                <a:prstDash val="solid"/>
+              </a:ln>
+              <a:solidFill>
+                <a:srgbClr val="FFFFFF"/>
+              </a:solidFill>
+              <a:effectLst>
+                <a:outerShdw blurRad="50800" dist="38100" dir="2700000" algn="tl" rotWithShape="0">
+                  <a:prstClr val="black">
+                    <a:alpha val="40000"/>
+                  </a:prstClr>
+                </a:outerShdw>
+              </a:effectLst>
+              <a:latin typeface="Times New Roman" pitchFamily="18" charset="0"/>
+              <a:cs typeface="Times New Roman" pitchFamily="18" charset="0"/>
+            </a:endParaRPr>
           </a:p>
           <a:p>
             <a:pPr>
@@ -16821,7 +18417,7 @@
               <a:defRPr/>
             </a:pPr>
             <a:r>
-              <a:rPr lang="sk-SK" sz="2000" kern="0" smtClean="0">
+              <a:rPr lang="sk-SK" sz="2000" kern="0" dirty="0" smtClean="0">
                 <a:ln w="18415" cmpd="sng">
                   <a:noFill/>
                   <a:prstDash val="solid"/>
@@ -16842,7 +18438,7 @@
               <a:t> </a:t>
             </a:r>
             <a:r>
-              <a:rPr lang="sk-SK" sz="2000" kern="0" smtClean="0">
+              <a:rPr lang="sk-SK" sz="2000" kern="0" dirty="0" smtClean="0">
                 <a:ln w="18415" cmpd="sng">
                   <a:noFill/>
                   <a:prstDash val="solid"/>
@@ -16860,7 +18456,49 @@
                 <a:latin typeface="Times New Roman" pitchFamily="18" charset="0"/>
                 <a:cs typeface="Times New Roman" pitchFamily="18" charset="0"/>
               </a:rPr>
-              <a:t>Analyzované aktuálne vytváranie a vykresľovanie grafických blokov </a:t>
+              <a:t>Chýba podpora základných operácií ako: </a:t>
+            </a:r>
+            <a:r>
+              <a:rPr lang="sk-SK" sz="2000" kern="0" dirty="0" err="1" smtClean="0">
+                <a:ln w="18415" cmpd="sng">
+                  <a:noFill/>
+                  <a:prstDash val="solid"/>
+                </a:ln>
+                <a:solidFill>
+                  <a:srgbClr val="FFFFFF"/>
+                </a:solidFill>
+                <a:effectLst>
+                  <a:outerShdw blurRad="50800" dist="38100" dir="2700000" algn="tl" rotWithShape="0">
+                    <a:prstClr val="black">
+                      <a:alpha val="40000"/>
+                    </a:prstClr>
+                  </a:outerShdw>
+                </a:effectLst>
+                <a:latin typeface="Times New Roman" pitchFamily="18" charset="0"/>
+                <a:cs typeface="Times New Roman" pitchFamily="18" charset="0"/>
+              </a:rPr>
+              <a:t>Undo</a:t>
+            </a:r>
+            <a:r>
+              <a:rPr lang="en-US" sz="2000" kern="0" dirty="0" smtClean="0">
+                <a:ln w="18415" cmpd="sng">
+                  <a:noFill/>
+                  <a:prstDash val="solid"/>
+                </a:ln>
+                <a:solidFill>
+                  <a:srgbClr val="FFFFFF"/>
+                </a:solidFill>
+                <a:effectLst>
+                  <a:outerShdw blurRad="50800" dist="38100" dir="2700000" algn="tl" rotWithShape="0">
+                    <a:prstClr val="black">
+                      <a:alpha val="40000"/>
+                    </a:prstClr>
+                  </a:outerShdw>
+                </a:effectLst>
+                <a:latin typeface="Times New Roman" pitchFamily="18" charset="0"/>
+                <a:cs typeface="Times New Roman" pitchFamily="18" charset="0"/>
+              </a:rPr>
+              <a:t>/Redo, Copy/Paste</a:t>
             </a:r>
           </a:p>
           <a:p>
@@ -16873,7 +18511,7 @@
               <a:defRPr/>
             </a:pPr>
             <a:r>
-              <a:rPr lang="sk-SK" sz="2000" kern="0" smtClean="0">
+              <a:rPr lang="sk-SK" sz="2000" kern="0" dirty="0" smtClean="0">
                 <a:ln w="18415" cmpd="sng">
                   <a:noFill/>
                   <a:prstDash val="solid"/>
@@ -16893,7 +18531,7 @@
               </a:rPr>
               <a:t> Aká je súčasná podpora práce s textom a kde má svoje medzery</a:t>
             </a:r>
-            <a:endParaRPr lang="pl-PL" sz="2000" kern="0" smtClean="0">
+            <a:endParaRPr lang="pl-PL" sz="2000" kern="0" dirty="0" smtClean="0">
               <a:ln w="18415" cmpd="sng">
                 <a:noFill/>
                 <a:prstDash val="solid"/>
@@ -17647,7 +19285,7 @@
               <a:defRPr/>
             </a:pPr>
             <a:r>
-              <a:rPr lang="sk-SK" sz="2000" kern="0" smtClean="0">
+              <a:rPr lang="sk-SK" sz="2000" kern="0" dirty="0" smtClean="0">
                 <a:ln w="18415" cmpd="sng">
                   <a:noFill/>
                   <a:prstDash val="solid"/>
@@ -17678,7 +19316,7 @@
               <a:defRPr/>
             </a:pPr>
             <a:r>
-              <a:rPr lang="sk-SK" sz="2000" kern="0" smtClean="0">
+              <a:rPr lang="sk-SK" sz="2000" kern="0" dirty="0" smtClean="0">
                 <a:ln w="18415" cmpd="sng">
                   <a:noFill/>
                   <a:prstDash val="solid"/>
@@ -17709,7 +19347,7 @@
               <a:defRPr/>
             </a:pPr>
             <a:r>
-              <a:rPr lang="sk-SK" sz="2000" kern="0" smtClean="0">
+              <a:rPr lang="sk-SK" sz="2000" kern="0" dirty="0" smtClean="0">
                 <a:ln w="18415" cmpd="sng">
                   <a:noFill/>
                   <a:prstDash val="solid"/>
@@ -17740,7 +19378,7 @@
               <a:defRPr/>
             </a:pPr>
             <a:r>
-              <a:rPr lang="sk-SK" sz="2000" kern="0" smtClean="0">
+              <a:rPr lang="sk-SK" sz="2000" kern="0" dirty="0" smtClean="0">
                 <a:ln w="18415" cmpd="sng">
                   <a:noFill/>
                   <a:prstDash val="solid"/>
@@ -17758,49 +19396,7 @@
                 <a:latin typeface="Times New Roman" pitchFamily="18" charset="0"/>
                 <a:cs typeface="Times New Roman" pitchFamily="18" charset="0"/>
               </a:rPr>
-              <a:t> Prenesenie </a:t>
-            </a:r>
-            <a:r>
-              <a:rPr lang="sk-SK" sz="2000" kern="0" smtClean="0">
-                <a:ln w="18415" cmpd="sng">
-                  <a:noFill/>
-                  <a:prstDash val="solid"/>
-                </a:ln>
-                <a:solidFill>
-                  <a:srgbClr val="FFFFFF"/>
-                </a:solidFill>
-                <a:effectLst>
-                  <a:outerShdw blurRad="50800" dist="38100" dir="2700000" algn="tl" rotWithShape="0">
-                    <a:prstClr val="black">
-                      <a:alpha val="40000"/>
-                    </a:prstClr>
-                  </a:outerShdw>
-                </a:effectLst>
-                <a:latin typeface="Times New Roman" pitchFamily="18" charset="0"/>
-                <a:cs typeface="Times New Roman" pitchFamily="18" charset="0"/>
-              </a:rPr>
-              <a:t>spracovania </a:t>
-            </a:r>
-            <a:r>
-              <a:rPr lang="sk-SK" sz="2000" kern="0" smtClean="0">
-                <a:ln w="18415" cmpd="sng">
-                  <a:noFill/>
-                  <a:prstDash val="solid"/>
-                </a:ln>
-                <a:solidFill>
-                  <a:srgbClr val="FFFFFF"/>
-                </a:solidFill>
-                <a:effectLst>
-                  <a:outerShdw blurRad="50800" dist="38100" dir="2700000" algn="tl" rotWithShape="0">
-                    <a:prstClr val="black">
-                      <a:alpha val="40000"/>
-                    </a:prstClr>
-                  </a:outerShdw>
-                </a:effectLst>
-                <a:latin typeface="Times New Roman" pitchFamily="18" charset="0"/>
-                <a:cs typeface="Times New Roman" pitchFamily="18" charset="0"/>
-              </a:rPr>
-              <a:t>AST stromu na stranu LUA</a:t>
+              <a:t> Prenesenie spracovania AST stromu na stranu LUA</a:t>
             </a:r>
           </a:p>
           <a:p>
@@ -17813,7 +19409,7 @@
               <a:defRPr/>
             </a:pPr>
             <a:r>
-              <a:rPr lang="sk-SK" sz="2000" kern="0" smtClean="0">
+              <a:rPr lang="sk-SK" sz="2000" kern="0" dirty="0" smtClean="0">
                 <a:ln w="18415" cmpd="sng">
                   <a:noFill/>
                   <a:prstDash val="solid"/>
@@ -17831,7 +19427,133 @@
                 <a:latin typeface="Times New Roman" pitchFamily="18" charset="0"/>
                 <a:cs typeface="Times New Roman" pitchFamily="18" charset="0"/>
               </a:rPr>
-              <a:t> Zabudovanie pokročilej práce s textom – Undo, Redo, Copy/Paste</a:t>
+              <a:t> Zabudovanie pokročilej práce s textom – </a:t>
+            </a:r>
+            <a:r>
+              <a:rPr lang="sk-SK" sz="2000" kern="0" dirty="0" err="1" smtClean="0">
+                <a:ln w="18415" cmpd="sng">
+                  <a:noFill/>
+                  <a:prstDash val="solid"/>
+                </a:ln>
+                <a:solidFill>
+                  <a:srgbClr val="FFFFFF"/>
+                </a:solidFill>
+                <a:effectLst>
+                  <a:outerShdw blurRad="50800" dist="38100" dir="2700000" algn="tl" rotWithShape="0">
+                    <a:prstClr val="black">
+                      <a:alpha val="40000"/>
+                    </a:prstClr>
+                  </a:outerShdw>
+                </a:effectLst>
+                <a:latin typeface="Times New Roman" pitchFamily="18" charset="0"/>
+                <a:cs typeface="Times New Roman" pitchFamily="18" charset="0"/>
+              </a:rPr>
+              <a:t>Undo</a:t>
+            </a:r>
+            <a:r>
+              <a:rPr lang="sk-SK" sz="2000" kern="0" dirty="0" smtClean="0">
+                <a:ln w="18415" cmpd="sng">
+                  <a:noFill/>
+                  <a:prstDash val="solid"/>
+                </a:ln>
+                <a:solidFill>
+                  <a:srgbClr val="FFFFFF"/>
+                </a:solidFill>
+                <a:effectLst>
+                  <a:outerShdw blurRad="50800" dist="38100" dir="2700000" algn="tl" rotWithShape="0">
+                    <a:prstClr val="black">
+                      <a:alpha val="40000"/>
+                    </a:prstClr>
+                  </a:outerShdw>
+                </a:effectLst>
+                <a:latin typeface="Times New Roman" pitchFamily="18" charset="0"/>
+                <a:cs typeface="Times New Roman" pitchFamily="18" charset="0"/>
+              </a:rPr>
+              <a:t>, </a:t>
+            </a:r>
+            <a:r>
+              <a:rPr lang="sk-SK" sz="2000" kern="0" dirty="0" err="1" smtClean="0">
+                <a:ln w="18415" cmpd="sng">
+                  <a:noFill/>
+                  <a:prstDash val="solid"/>
+                </a:ln>
+                <a:solidFill>
+                  <a:srgbClr val="FFFFFF"/>
+                </a:solidFill>
+                <a:effectLst>
+                  <a:outerShdw blurRad="50800" dist="38100" dir="2700000" algn="tl" rotWithShape="0">
+                    <a:prstClr val="black">
+                      <a:alpha val="40000"/>
+                    </a:prstClr>
+                  </a:outerShdw>
+                </a:effectLst>
+                <a:latin typeface="Times New Roman" pitchFamily="18" charset="0"/>
+                <a:cs typeface="Times New Roman" pitchFamily="18" charset="0"/>
+              </a:rPr>
+              <a:t>Redo</a:t>
+            </a:r>
+            <a:r>
+              <a:rPr lang="sk-SK" sz="2000" kern="0" dirty="0" smtClean="0">
+                <a:ln w="18415" cmpd="sng">
+                  <a:noFill/>
+                  <a:prstDash val="solid"/>
+                </a:ln>
+                <a:solidFill>
+                  <a:srgbClr val="FFFFFF"/>
+                </a:solidFill>
+                <a:effectLst>
+                  <a:outerShdw blurRad="50800" dist="38100" dir="2700000" algn="tl" rotWithShape="0">
+                    <a:prstClr val="black">
+                      <a:alpha val="40000"/>
+                    </a:prstClr>
+                  </a:outerShdw>
+                </a:effectLst>
+                <a:latin typeface="Times New Roman" pitchFamily="18" charset="0"/>
+                <a:cs typeface="Times New Roman" pitchFamily="18" charset="0"/>
+              </a:rPr>
+              <a:t>, </a:t>
+            </a:r>
+            <a:r>
+              <a:rPr lang="sk-SK" sz="2000" kern="0" dirty="0" err="1" smtClean="0">
+                <a:ln w="18415" cmpd="sng">
+                  <a:noFill/>
+                  <a:prstDash val="solid"/>
+                </a:ln>
+                <a:solidFill>
+                  <a:srgbClr val="FFFFFF"/>
+                </a:solidFill>
+                <a:effectLst>
+                  <a:outerShdw blurRad="50800" dist="38100" dir="2700000" algn="tl" rotWithShape="0">
+                    <a:prstClr val="black">
+                      <a:alpha val="40000"/>
+                    </a:prstClr>
+                  </a:outerShdw>
+                </a:effectLst>
+                <a:latin typeface="Times New Roman" pitchFamily="18" charset="0"/>
+                <a:cs typeface="Times New Roman" pitchFamily="18" charset="0"/>
+              </a:rPr>
+              <a:t>Copy</a:t>
+            </a:r>
+            <a:r>
+              <a:rPr lang="sk-SK" sz="2000" kern="0" dirty="0" smtClean="0">
+                <a:ln w="18415" cmpd="sng">
+                  <a:noFill/>
+                  <a:prstDash val="solid"/>
+                </a:ln>
+                <a:solidFill>
+                  <a:srgbClr val="FFFFFF"/>
+                </a:solidFill>
+                <a:effectLst>
+                  <a:outerShdw blurRad="50800" dist="38100" dir="2700000" algn="tl" rotWithShape="0">
+                    <a:prstClr val="black">
+                      <a:alpha val="40000"/>
+                    </a:prstClr>
+                  </a:outerShdw>
+                </a:effectLst>
+                <a:latin typeface="Times New Roman" pitchFamily="18" charset="0"/>
+                <a:cs typeface="Times New Roman" pitchFamily="18" charset="0"/>
+              </a:rPr>
+              <a:t>/Paste</a:t>
             </a:r>
           </a:p>
           <a:p>
@@ -17844,7 +19566,7 @@
               <a:defRPr/>
             </a:pPr>
             <a:r>
-              <a:rPr lang="sk-SK" sz="2000" kern="0" smtClean="0">
+              <a:rPr lang="sk-SK" sz="2000" kern="0" dirty="0" smtClean="0">
                 <a:ln w="18415" cmpd="sng">
                   <a:noFill/>
                   <a:prstDash val="solid"/>
@@ -17862,10 +19584,10 @@
                 <a:latin typeface="Times New Roman" pitchFamily="18" charset="0"/>
                 <a:cs typeface="Times New Roman" pitchFamily="18" charset="0"/>
               </a:rPr>
-              <a:t> </a:t>
-            </a:r>
-            <a:r>
-              <a:rPr lang="sk-SK" sz="2000" kern="0" smtClean="0">
+              <a:t> Zabudovanie a vytvorenie vlastných </a:t>
+            </a:r>
+            <a:r>
+              <a:rPr lang="sk-SK" sz="2000" kern="0" dirty="0" err="1" smtClean="0">
                 <a:ln w="18415" cmpd="sng">
                   <a:noFill/>
                   <a:prstDash val="solid"/>
@@ -17883,30 +19605,9 @@
                 <a:latin typeface="Times New Roman" pitchFamily="18" charset="0"/>
                 <a:cs typeface="Times New Roman" pitchFamily="18" charset="0"/>
               </a:rPr>
-              <a:t>Zabudovanie a vytvorenie vlastných </a:t>
-            </a:r>
-            <a:r>
-              <a:rPr lang="sk-SK" sz="2000" kern="0" smtClean="0">
-                <a:ln w="18415" cmpd="sng">
-                  <a:noFill/>
-                  <a:prstDash val="solid"/>
-                </a:ln>
-                <a:solidFill>
-                  <a:srgbClr val="FFFFFF"/>
-                </a:solidFill>
-                <a:effectLst>
-                  <a:outerShdw blurRad="50800" dist="38100" dir="2700000" algn="tl" rotWithShape="0">
-                    <a:prstClr val="black">
-                      <a:alpha val="40000"/>
-                    </a:prstClr>
-                  </a:outerShdw>
-                </a:effectLst>
-                <a:latin typeface="Times New Roman" pitchFamily="18" charset="0"/>
-                <a:cs typeface="Times New Roman" pitchFamily="18" charset="0"/>
-              </a:rPr>
               <a:t>Shortcuts</a:t>
             </a:r>
-            <a:endParaRPr lang="pl-PL" sz="2000" kern="0" smtClean="0">
+            <a:endParaRPr lang="pl-PL" sz="2000" kern="0" dirty="0" smtClean="0">
               <a:ln w="18415" cmpd="sng">
                 <a:noFill/>
                 <a:prstDash val="solid"/>
@@ -18709,28 +20410,7 @@
                 <a:latin typeface="Times New Roman" pitchFamily="18" charset="0"/>
                 <a:cs typeface="Times New Roman" pitchFamily="18" charset="0"/>
               </a:rPr>
-              <a:t> </a:t>
-            </a:r>
-            <a:r>
-              <a:rPr lang="pl-PL" sz="2000" kern="0" smtClean="0">
-                <a:ln w="18415" cmpd="sng">
-                  <a:noFill/>
-                  <a:prstDash val="solid"/>
-                </a:ln>
-                <a:solidFill>
-                  <a:srgbClr val="FFFFFF"/>
-                </a:solidFill>
-                <a:effectLst>
-                  <a:outerShdw blurRad="50800" dist="38100" dir="2700000" algn="tl" rotWithShape="0">
-                    <a:prstClr val="black">
-                      <a:alpha val="40000"/>
-                    </a:prstClr>
-                  </a:outerShdw>
-                </a:effectLst>
-                <a:latin typeface="Times New Roman" pitchFamily="18" charset="0"/>
-                <a:cs typeface="Times New Roman" pitchFamily="18" charset="0"/>
-              </a:rPr>
-              <a:t>Modulárnosť</a:t>
+              <a:t> Modulárnosť</a:t>
             </a:r>
           </a:p>
           <a:p>
@@ -18761,49 +20441,7 @@
                 <a:latin typeface="Times New Roman" pitchFamily="18" charset="0"/>
                 <a:cs typeface="Times New Roman" pitchFamily="18" charset="0"/>
               </a:rPr>
-              <a:t> Poskytnúť možnosti </a:t>
-            </a:r>
-            <a:r>
-              <a:rPr lang="sk-SK" sz="2000" kern="0" smtClean="0">
-                <a:ln w="18415" cmpd="sng">
-                  <a:noFill/>
-                  <a:prstDash val="solid"/>
-                </a:ln>
-                <a:solidFill>
-                  <a:srgbClr val="FFFFFF"/>
-                </a:solidFill>
-                <a:effectLst>
-                  <a:outerShdw blurRad="50800" dist="38100" dir="2700000" algn="tl" rotWithShape="0">
-                    <a:prstClr val="black">
-                      <a:alpha val="40000"/>
-                    </a:prstClr>
-                  </a:outerShdw>
-                </a:effectLst>
-                <a:latin typeface="Times New Roman" pitchFamily="18" charset="0"/>
-                <a:cs typeface="Times New Roman" pitchFamily="18" charset="0"/>
-              </a:rPr>
-              <a:t>konfigurácie </a:t>
-            </a:r>
-            <a:r>
-              <a:rPr lang="sk-SK" sz="2000" kern="0" smtClean="0">
-                <a:ln w="18415" cmpd="sng">
-                  <a:noFill/>
-                  <a:prstDash val="solid"/>
-                </a:ln>
-                <a:solidFill>
-                  <a:srgbClr val="FFFFFF"/>
-                </a:solidFill>
-                <a:effectLst>
-                  <a:outerShdw blurRad="50800" dist="38100" dir="2700000" algn="tl" rotWithShape="0">
-                    <a:prstClr val="black">
-                      <a:alpha val="40000"/>
-                    </a:prstClr>
-                  </a:outerShdw>
-                </a:effectLst>
-                <a:latin typeface="Times New Roman" pitchFamily="18" charset="0"/>
-                <a:cs typeface="Times New Roman" pitchFamily="18" charset="0"/>
-              </a:rPr>
-              <a:t>editora</a:t>
+              <a:t> Poskytnúť možnosti konfigurácie editora</a:t>
             </a:r>
             <a:endParaRPr lang="pl-PL" sz="2000" kern="0" smtClean="0">
               <a:ln w="18415" cmpd="sng">

</xml_diff>